<commit_message>
revised presentation, added copy with UTRC template
</commit_message>
<xml_diff>
--- a/Presentation/RMpresentation.pptx
+++ b/Presentation/RMpresentation.pptx
@@ -5,10 +5,10 @@
     <p:sldMasterId id="2147483672" r:id="rId1"/>
   </p:sldMasterIdLst>
   <p:notesMasterIdLst>
-    <p:notesMasterId r:id="rId30"/>
+    <p:notesMasterId r:id="rId31"/>
   </p:notesMasterIdLst>
   <p:handoutMasterIdLst>
-    <p:handoutMasterId r:id="rId31"/>
+    <p:handoutMasterId r:id="rId32"/>
   </p:handoutMasterIdLst>
   <p:sldIdLst>
     <p:sldId id="276" r:id="rId2"/>
@@ -35,10 +35,11 @@
     <p:sldId id="307" r:id="rId23"/>
     <p:sldId id="308" r:id="rId24"/>
     <p:sldId id="309" r:id="rId25"/>
-    <p:sldId id="310" r:id="rId26"/>
-    <p:sldId id="311" r:id="rId27"/>
-    <p:sldId id="312" r:id="rId28"/>
-    <p:sldId id="313" r:id="rId29"/>
+    <p:sldId id="318" r:id="rId26"/>
+    <p:sldId id="310" r:id="rId27"/>
+    <p:sldId id="311" r:id="rId28"/>
+    <p:sldId id="312" r:id="rId29"/>
+    <p:sldId id="313" r:id="rId30"/>
   </p:sldIdLst>
   <p:sldSz cx="9144000" cy="6858000" type="screen4x3"/>
   <p:notesSz cx="6858000" cy="9144000"/>
@@ -222,7 +223,7 @@
           <a:p>
             <a:fld id="{4B54F122-EBE1-4B36-A32A-DF976CA0B9CE}" type="datetimeFigureOut">
               <a:rPr lang="en-US" smtClean="0"/>
-              <a:t>7/4/2017</a:t>
+              <a:t>7/5/2017</a:t>
             </a:fld>
             <a:endParaRPr lang="en-US"/>
           </a:p>
@@ -388,7 +389,7 @@
           <a:p>
             <a:fld id="{36A6D4C5-FD34-4C91-B641-2E45D2FA3FCD}" type="datetimeFigureOut">
               <a:rPr lang="en-US" smtClean="0"/>
-              <a:t>7/4/2017</a:t>
+              <a:t>7/5/2017</a:t>
             </a:fld>
             <a:endParaRPr lang="en-US"/>
           </a:p>
@@ -3211,6 +3212,128 @@
 </p:notes>
 </file>
 
+<file path=ppt/notesSlides/notesSlide28.xml><?xml version="1.0" encoding="utf-8"?>
+<p:notes xmlns:a="http://schemas.openxmlformats.org/drawingml/2006/main" xmlns:r="http://schemas.openxmlformats.org/officeDocument/2006/relationships" xmlns:p="http://schemas.openxmlformats.org/presentationml/2006/main">
+  <p:cSld>
+    <p:spTree>
+      <p:nvGrpSpPr>
+        <p:cNvPr id="1" name=""/>
+        <p:cNvGrpSpPr/>
+        <p:nvPr/>
+      </p:nvGrpSpPr>
+      <p:grpSpPr>
+        <a:xfrm>
+          <a:off x="0" y="0"/>
+          <a:ext cx="0" cy="0"/>
+          <a:chOff x="0" y="0"/>
+          <a:chExt cx="0" cy="0"/>
+        </a:xfrm>
+      </p:grpSpPr>
+      <p:sp>
+        <p:nvSpPr>
+          <p:cNvPr id="2" name="Slide Image Placeholder 1"/>
+          <p:cNvSpPr>
+            <a:spLocks noGrp="1" noRot="1" noChangeAspect="1"/>
+          </p:cNvSpPr>
+          <p:nvPr>
+            <p:ph type="sldImg"/>
+          </p:nvPr>
+        </p:nvSpPr>
+        <p:spPr/>
+      </p:sp>
+      <p:sp>
+        <p:nvSpPr>
+          <p:cNvPr id="3" name="Notes Placeholder 2"/>
+          <p:cNvSpPr>
+            <a:spLocks noGrp="1"/>
+          </p:cNvSpPr>
+          <p:nvPr>
+            <p:ph type="body" idx="1"/>
+          </p:nvPr>
+        </p:nvSpPr>
+        <p:spPr/>
+        <p:txBody>
+          <a:bodyPr/>
+          <a:lstStyle/>
+          <a:p>
+            <a:endParaRPr lang="en-US"/>
+          </a:p>
+        </p:txBody>
+      </p:sp>
+      <p:sp>
+        <p:nvSpPr>
+          <p:cNvPr id="4" name="Slide Number Placeholder 3"/>
+          <p:cNvSpPr>
+            <a:spLocks noGrp="1"/>
+          </p:cNvSpPr>
+          <p:nvPr>
+            <p:ph type="sldNum" sz="quarter" idx="10"/>
+          </p:nvPr>
+        </p:nvSpPr>
+        <p:spPr/>
+        <p:txBody>
+          <a:bodyPr/>
+          <a:lstStyle/>
+          <a:p>
+            <a:fld id="{A507BF40-DB3D-452B-ABD4-9F286B0CD362}" type="slidenum">
+              <a:rPr lang="en-US" smtClean="0"/>
+              <a:t>29</a:t>
+            </a:fld>
+            <a:endParaRPr lang="en-US"/>
+          </a:p>
+        </p:txBody>
+      </p:sp>
+      <p:sp>
+        <p:nvSpPr>
+          <p:cNvPr id="5" name="Footer Placeholder 4"/>
+          <p:cNvSpPr>
+            <a:spLocks noGrp="1"/>
+          </p:cNvSpPr>
+          <p:nvPr>
+            <p:ph type="ftr" sz="quarter" idx="11"/>
+          </p:nvPr>
+        </p:nvSpPr>
+        <p:spPr/>
+        <p:txBody>
+          <a:bodyPr/>
+          <a:lstStyle/>
+          <a:p>
+            <a:endParaRPr lang="en-US"/>
+          </a:p>
+        </p:txBody>
+      </p:sp>
+      <p:sp>
+        <p:nvSpPr>
+          <p:cNvPr id="6" name="Header Placeholder 5"/>
+          <p:cNvSpPr>
+            <a:spLocks noGrp="1"/>
+          </p:cNvSpPr>
+          <p:nvPr>
+            <p:ph type="hdr" sz="quarter" idx="12"/>
+          </p:nvPr>
+        </p:nvSpPr>
+        <p:spPr/>
+        <p:txBody>
+          <a:bodyPr/>
+          <a:lstStyle/>
+          <a:p>
+            <a:endParaRPr lang="en-US"/>
+          </a:p>
+        </p:txBody>
+      </p:sp>
+    </p:spTree>
+    <p:extLst>
+      <p:ext uri="{BB962C8B-B14F-4D97-AF65-F5344CB8AC3E}">
+        <p14:creationId xmlns:p14="http://schemas.microsoft.com/office/powerpoint/2010/main" val="4280532525"/>
+      </p:ext>
+    </p:extLst>
+  </p:cSld>
+  <p:clrMapOvr>
+    <a:masterClrMapping/>
+  </p:clrMapOvr>
+</p:notes>
+</file>
+
 <file path=ppt/notesSlides/notesSlide3.xml><?xml version="1.0" encoding="utf-8"?>
 <p:notes xmlns:a="http://schemas.openxmlformats.org/drawingml/2006/main" xmlns:r="http://schemas.openxmlformats.org/officeDocument/2006/relationships" xmlns:p="http://schemas.openxmlformats.org/presentationml/2006/main">
   <p:cSld>
@@ -4246,7 +4369,7 @@
           <a:p>
             <a:fld id="{BC4FC172-2285-4F3F-90AE-297060597800}" type="datetime4">
               <a:rPr lang="en-US" smtClean="0"/>
-              <a:t>July 4, 2017</a:t>
+              <a:t>July 5, 2017</a:t>
             </a:fld>
             <a:endParaRPr lang="en-US"/>
           </a:p>
@@ -4415,7 +4538,7 @@
           <a:p>
             <a:fld id="{36708E99-C0BD-4105-BD8C-C8DD6A9CFD5E}" type="datetime4">
               <a:rPr lang="en-US" smtClean="0"/>
-              <a:t>July 4, 2017</a:t>
+              <a:t>July 5, 2017</a:t>
             </a:fld>
             <a:endParaRPr lang="en-US"/>
           </a:p>
@@ -4594,7 +4717,7 @@
           <a:p>
             <a:fld id="{64FC8515-61F8-45EE-9F90-056934BE64AD}" type="datetime4">
               <a:rPr lang="en-US" smtClean="0"/>
-              <a:t>July 4, 2017</a:t>
+              <a:t>July 5, 2017</a:t>
             </a:fld>
             <a:endParaRPr lang="en-US"/>
           </a:p>
@@ -4763,7 +4886,7 @@
           <a:p>
             <a:fld id="{1862D449-42D1-4AAD-A479-E41B5E9877E6}" type="datetime4">
               <a:rPr lang="en-US" smtClean="0"/>
-              <a:t>July 4, 2017</a:t>
+              <a:t>July 5, 2017</a:t>
             </a:fld>
             <a:endParaRPr lang="en-US"/>
           </a:p>
@@ -5008,7 +5131,7 @@
           <a:p>
             <a:fld id="{5604E420-81E6-483F-B7A3-EB6F72782881}" type="datetime4">
               <a:rPr lang="en-US" smtClean="0"/>
-              <a:t>July 4, 2017</a:t>
+              <a:t>July 5, 2017</a:t>
             </a:fld>
             <a:endParaRPr lang="en-US"/>
           </a:p>
@@ -5295,7 +5418,7 @@
           <a:p>
             <a:fld id="{EBC48570-156B-4C5D-BAE8-BBD1B6E78B00}" type="datetime4">
               <a:rPr lang="en-US" smtClean="0"/>
-              <a:t>July 4, 2017</a:t>
+              <a:t>July 5, 2017</a:t>
             </a:fld>
             <a:endParaRPr lang="en-US"/>
           </a:p>
@@ -5716,7 +5839,7 @@
           <a:p>
             <a:fld id="{1146C381-7E3D-43D0-9B17-A9A27FD9B9E3}" type="datetime4">
               <a:rPr lang="en-US" smtClean="0"/>
-              <a:t>July 4, 2017</a:t>
+              <a:t>July 5, 2017</a:t>
             </a:fld>
             <a:endParaRPr lang="en-US"/>
           </a:p>
@@ -5833,7 +5956,7 @@
           <a:p>
             <a:fld id="{5FD47DC1-EFF6-4BD4-B68D-DC946D4FF183}" type="datetime4">
               <a:rPr lang="en-US" smtClean="0"/>
-              <a:t>July 4, 2017</a:t>
+              <a:t>July 5, 2017</a:t>
             </a:fld>
             <a:endParaRPr lang="en-US"/>
           </a:p>
@@ -5927,7 +6050,7 @@
           <a:p>
             <a:fld id="{99640ABE-3A16-47D2-9F90-0E743FF25D39}" type="datetime4">
               <a:rPr lang="en-US" smtClean="0"/>
-              <a:t>July 4, 2017</a:t>
+              <a:t>July 5, 2017</a:t>
             </a:fld>
             <a:endParaRPr lang="en-US"/>
           </a:p>
@@ -6203,7 +6326,7 @@
           <a:p>
             <a:fld id="{3C2A2417-FDE2-41D0-8887-15C0F82FDA20}" type="datetime4">
               <a:rPr lang="en-US" smtClean="0"/>
-              <a:t>July 4, 2017</a:t>
+              <a:t>July 5, 2017</a:t>
             </a:fld>
             <a:endParaRPr lang="en-US"/>
           </a:p>
@@ -6459,7 +6582,7 @@
           <a:p>
             <a:fld id="{12A13EAD-E644-4DBB-9D93-AD67529ED913}" type="datetime4">
               <a:rPr lang="en-US" smtClean="0"/>
-              <a:t>July 4, 2017</a:t>
+              <a:t>July 5, 2017</a:t>
             </a:fld>
             <a:endParaRPr lang="en-US"/>
           </a:p>
@@ -6671,7 +6794,7 @@
           <a:p>
             <a:fld id="{10D1729A-927C-4D1D-81C9-37B1B95DAD1D}" type="datetime4">
               <a:rPr lang="en-US" smtClean="0"/>
-              <a:t>July 4, 2017</a:t>
+              <a:t>July 5, 2017</a:t>
             </a:fld>
             <a:endParaRPr lang="en-US"/>
           </a:p>
@@ -7063,7 +7186,7 @@
           <a:p>
             <a:fld id="{1862D449-42D1-4AAD-A479-E41B5E9877E6}" type="datetime4">
               <a:rPr lang="en-US" smtClean="0"/>
-              <a:t>July 4, 2017</a:t>
+              <a:t>July 5, 2017</a:t>
             </a:fld>
             <a:endParaRPr lang="en-US"/>
           </a:p>
@@ -7230,7 +7353,7 @@
                 <a:ea typeface="Lato" panose="020F0502020204030203" pitchFamily="34" charset="0"/>
                 <a:cs typeface="Lato" panose="020F0502020204030203" pitchFamily="34" charset="0"/>
               </a:rPr>
-              <a:t>July 4, 2017</a:t>
+              <a:t>July 5, 2017</a:t>
             </a:fld>
             <a:endParaRPr lang="en-US" dirty="0">
               <a:solidFill>
@@ -8869,7 +8992,7 @@
                 <a:ea typeface="Lato" panose="020F0502020204030203" pitchFamily="34" charset="0"/>
                 <a:cs typeface="Lato" panose="020F0502020204030203" pitchFamily="34" charset="0"/>
               </a:rPr>
-              <a:t>July 4, 2017</a:t>
+              <a:t>July 5, 2017</a:t>
             </a:fld>
             <a:endParaRPr lang="en-US" dirty="0">
               <a:solidFill>
@@ -11205,7 +11328,7 @@
                 <a:ea typeface="Lato" panose="020F0502020204030203" pitchFamily="34" charset="0"/>
                 <a:cs typeface="Lato" panose="020F0502020204030203" pitchFamily="34" charset="0"/>
               </a:rPr>
-              <a:t>July 4, 2017</a:t>
+              <a:t>July 5, 2017</a:t>
             </a:fld>
             <a:endParaRPr lang="en-US" dirty="0">
               <a:solidFill>
@@ -11707,15 +11830,7 @@
                 <a:ea typeface="Lato" panose="020F0502020204030203" pitchFamily="34" charset="0"/>
                 <a:cs typeface="Lato" panose="020F0502020204030203" pitchFamily="34" charset="0"/>
               </a:rPr>
-              <a:t>the </a:t>
-            </a:r>
-            <a:r>
-              <a:rPr lang="en-GB" i="1" dirty="0" smtClean="0">
-                <a:latin typeface="Lato" panose="020F0502020204030203" pitchFamily="34" charset="0"/>
-                <a:ea typeface="Lato" panose="020F0502020204030203" pitchFamily="34" charset="0"/>
-                <a:cs typeface="Lato" panose="020F0502020204030203" pitchFamily="34" charset="0"/>
-              </a:rPr>
-              <a:t>motor speed </a:t>
+              <a:t>the motor speed </a:t>
             </a:r>
             <a:r>
               <a:rPr lang="en-GB" dirty="0" smtClean="0">
@@ -12335,7 +12450,7 @@
                 <a:ea typeface="Lato" panose="020F0502020204030203" pitchFamily="34" charset="0"/>
                 <a:cs typeface="Lato" panose="020F0502020204030203" pitchFamily="34" charset="0"/>
               </a:rPr>
-              <a:t>July 4, 2017</a:t>
+              <a:t>July 5, 2017</a:t>
             </a:fld>
             <a:endParaRPr lang="en-US" dirty="0">
               <a:solidFill>
@@ -12939,7 +13054,7 @@
                 <a:ea typeface="Lato" panose="020F0502020204030203" pitchFamily="34" charset="0"/>
                 <a:cs typeface="Lato" panose="020F0502020204030203" pitchFamily="34" charset="0"/>
               </a:rPr>
-              <a:t>July 4, 2017</a:t>
+              <a:t>July 5, 2017</a:t>
             </a:fld>
             <a:endParaRPr lang="en-US" dirty="0">
               <a:solidFill>
@@ -13327,23 +13442,7 @@
                 <a:ea typeface="Lato" panose="020F0502020204030203" pitchFamily="34" charset="0"/>
                 <a:cs typeface="Lato" panose="020F0502020204030203" pitchFamily="34" charset="0"/>
               </a:rPr>
-              <a:t>Exploit the </a:t>
-            </a:r>
-            <a:r>
-              <a:rPr lang="en-GB" dirty="0" smtClean="0">
-                <a:latin typeface="Lato" panose="020F0502020204030203" pitchFamily="34" charset="0"/>
-                <a:ea typeface="Lato" panose="020F0502020204030203" pitchFamily="34" charset="0"/>
-                <a:cs typeface="Lato" panose="020F0502020204030203" pitchFamily="34" charset="0"/>
-              </a:rPr>
-              <a:t>power </a:t>
-            </a:r>
-            <a:r>
-              <a:rPr lang="en-GB" dirty="0" smtClean="0">
-                <a:latin typeface="Lato" panose="020F0502020204030203" pitchFamily="34" charset="0"/>
-                <a:ea typeface="Lato" panose="020F0502020204030203" pitchFamily="34" charset="0"/>
-                <a:cs typeface="Lato" panose="020F0502020204030203" pitchFamily="34" charset="0"/>
-              </a:rPr>
-              <a:t>of formal logics without using it </a:t>
+              <a:t>Exploit the power of formal logics without using it </a:t>
             </a:r>
             <a:r>
               <a:rPr lang="en-GB" dirty="0">
@@ -13876,7 +13975,7 @@
                 <a:ea typeface="Lato" panose="020F0502020204030203" pitchFamily="34" charset="0"/>
                 <a:cs typeface="Lato" panose="020F0502020204030203" pitchFamily="34" charset="0"/>
               </a:rPr>
-              <a:t>July 4, 2017</a:t>
+              <a:t>July 5, 2017</a:t>
             </a:fld>
             <a:endParaRPr lang="en-US" dirty="0">
               <a:solidFill>
@@ -16449,7 +16548,7 @@
                 <a:ea typeface="Lato" panose="020F0502020204030203" pitchFamily="34" charset="0"/>
                 <a:cs typeface="Lato" panose="020F0502020204030203" pitchFamily="34" charset="0"/>
               </a:rPr>
-              <a:t>July 4, 2017</a:t>
+              <a:t>July 5, 2017</a:t>
             </a:fld>
             <a:endParaRPr lang="en-US" dirty="0">
               <a:solidFill>
@@ -17048,7 +17147,7 @@
                 <a:ea typeface="Lato" panose="020F0502020204030203" pitchFamily="34" charset="0"/>
                 <a:cs typeface="Lato" panose="020F0502020204030203" pitchFamily="34" charset="0"/>
               </a:rPr>
-              <a:t>July 4, 2017</a:t>
+              <a:t>July 5, 2017</a:t>
             </a:fld>
             <a:endParaRPr lang="en-US" dirty="0">
               <a:solidFill>
@@ -17605,7 +17704,7 @@
                 <a:ea typeface="Lato" panose="020F0502020204030203" pitchFamily="34" charset="0"/>
                 <a:cs typeface="Lato" panose="020F0502020204030203" pitchFamily="34" charset="0"/>
               </a:rPr>
-              <a:t>July 4, 2017</a:t>
+              <a:t>July 5, 2017</a:t>
             </a:fld>
             <a:endParaRPr lang="en-US" dirty="0">
               <a:solidFill>
@@ -18508,7 +18607,7 @@
                 <a:ea typeface="Lato" panose="020F0502020204030203" pitchFamily="34" charset="0"/>
                 <a:cs typeface="Lato" panose="020F0502020204030203" pitchFamily="34" charset="0"/>
               </a:rPr>
-              <a:t>July 4, 2017</a:t>
+              <a:t>July 5, 2017</a:t>
             </a:fld>
             <a:endParaRPr lang="en-US" dirty="0">
               <a:solidFill>
@@ -19027,7 +19126,7 @@
                 <a:ea typeface="Lato" panose="020F0502020204030203" pitchFamily="34" charset="0"/>
                 <a:cs typeface="Lato" panose="020F0502020204030203" pitchFamily="34" charset="0"/>
               </a:rPr>
-              <a:t>July 4, 2017</a:t>
+              <a:t>July 5, 2017</a:t>
             </a:fld>
             <a:endParaRPr lang="en-US" dirty="0">
               <a:solidFill>
@@ -19371,20 +19470,7 @@
                 <a:ea typeface="Lato" panose="020F0502020204030203" pitchFamily="34" charset="0"/>
                 <a:cs typeface="Lato" panose="020F0502020204030203" pitchFamily="34" charset="0"/>
               </a:rPr>
-              <a:t>The </a:t>
-            </a:r>
-            <a:r>
-              <a:rPr lang="en-GB" sz="2000" dirty="0" smtClean="0">
-                <a:solidFill>
-                  <a:schemeClr val="bg1">
-                    <a:lumMod val="75000"/>
-                  </a:schemeClr>
-                </a:solidFill>
-                <a:latin typeface="Lato" panose="020F0502020204030203" pitchFamily="34" charset="0"/>
-                <a:ea typeface="Lato" panose="020F0502020204030203" pitchFamily="34" charset="0"/>
-                <a:cs typeface="Lato" panose="020F0502020204030203" pitchFamily="34" charset="0"/>
-              </a:rPr>
-              <a:t>Framework</a:t>
+              <a:t>The Framework</a:t>
             </a:r>
           </a:p>
           <a:p>
@@ -19489,20 +19575,7 @@
                 <a:ea typeface="Lato" panose="020F0502020204030203" pitchFamily="34" charset="0"/>
                 <a:cs typeface="Lato" panose="020F0502020204030203" pitchFamily="34" charset="0"/>
               </a:rPr>
-              <a:t>Frequency </a:t>
-            </a:r>
-            <a:r>
-              <a:rPr lang="en-GB" sz="2000" dirty="0" smtClean="0">
-                <a:solidFill>
-                  <a:schemeClr val="bg1">
-                    <a:lumMod val="75000"/>
-                  </a:schemeClr>
-                </a:solidFill>
-                <a:latin typeface="Lato" panose="020F0502020204030203" pitchFamily="34" charset="0"/>
-                <a:ea typeface="Lato" panose="020F0502020204030203" pitchFamily="34" charset="0"/>
-                <a:cs typeface="Lato" panose="020F0502020204030203" pitchFamily="34" charset="0"/>
-              </a:rPr>
-              <a:t>Response</a:t>
+              <a:t>Frequency Response</a:t>
             </a:r>
           </a:p>
           <a:p>
@@ -19657,7 +19730,7 @@
                 <a:ea typeface="Lato" panose="020F0502020204030203" pitchFamily="34" charset="0"/>
                 <a:cs typeface="Lato" panose="020F0502020204030203" pitchFamily="34" charset="0"/>
               </a:rPr>
-              <a:t>July 4, 2017</a:t>
+              <a:t>July 5, 2017</a:t>
             </a:fld>
             <a:endParaRPr lang="en-US" dirty="0">
               <a:solidFill>
@@ -20286,7 +20359,7 @@
                 <a:ea typeface="Lato" panose="020F0502020204030203" pitchFamily="34" charset="0"/>
                 <a:cs typeface="Lato" panose="020F0502020204030203" pitchFamily="34" charset="0"/>
               </a:rPr>
-              <a:t>July 4, 2017</a:t>
+              <a:t>July 5, 2017</a:t>
             </a:fld>
             <a:endParaRPr lang="en-US" dirty="0">
               <a:solidFill>
@@ -21292,7 +21365,7 @@
 </file>
 
 <file path=ppt/slides/slide22.xml><?xml version="1.0" encoding="utf-8"?>
-<p:sld xmlns:a="http://schemas.openxmlformats.org/drawingml/2006/main" xmlns:r="http://schemas.openxmlformats.org/officeDocument/2006/relationships" xmlns:p="http://schemas.openxmlformats.org/presentationml/2006/main">
+<p:sld xmlns:a="http://schemas.openxmlformats.org/drawingml/2006/main" xmlns:r="http://schemas.openxmlformats.org/officeDocument/2006/relationships" xmlns:p="http://schemas.openxmlformats.org/presentationml/2006/main" show="0">
   <p:cSld>
     <p:spTree>
       <p:nvGrpSpPr>
@@ -21386,7 +21459,7 @@
                 <a:ea typeface="Lato" panose="020F0502020204030203" pitchFamily="34" charset="0"/>
                 <a:cs typeface="Lato" panose="020F0502020204030203" pitchFamily="34" charset="0"/>
               </a:rPr>
-              <a:t>July 4, 2017</a:t>
+              <a:t>July 5, 2017</a:t>
             </a:fld>
             <a:endParaRPr lang="en-US" dirty="0">
               <a:solidFill>
@@ -21616,8 +21689,8 @@
         </p:nvSpPr>
         <p:spPr>
           <a:xfrm>
-            <a:off x="395536" y="1231131"/>
-            <a:ext cx="8496943" cy="369332"/>
+            <a:off x="2663789" y="2492896"/>
+            <a:ext cx="4392488" cy="2585323"/>
           </a:xfrm>
           <a:prstGeom prst="rect">
             <a:avLst/>
@@ -21631,13 +21704,70 @@
           <a:lstStyle/>
           <a:p>
             <a:r>
-              <a:rPr lang="en-GB" dirty="0" smtClean="0">
-                <a:latin typeface="Lato" panose="020F0502020204030203" pitchFamily="34" charset="0"/>
-                <a:ea typeface="Lato" panose="020F0502020204030203" pitchFamily="34" charset="0"/>
-                <a:cs typeface="Lato" panose="020F0502020204030203" pitchFamily="34" charset="0"/>
-              </a:rPr>
-              <a:t>text</a:t>
-            </a:r>
+              <a:rPr lang="en-US" dirty="0"/>
+              <a:t>ID: R.1</a:t>
+            </a:r>
+          </a:p>
+          <a:p>
+            <a:r>
+              <a:rPr lang="en-US" dirty="0"/>
+              <a:t>TITLE</a:t>
+            </a:r>
+            <a:r>
+              <a:rPr lang="en-US" dirty="0" smtClean="0"/>
+              <a:t>: </a:t>
+            </a:r>
+            <a:r>
+              <a:rPr lang="en-US" dirty="0" err="1" smtClean="0"/>
+              <a:t>OvershootRiseTime</a:t>
+            </a:r>
+            <a:endParaRPr lang="en-US" dirty="0"/>
+          </a:p>
+          <a:p>
+            <a:r>
+              <a:rPr lang="en-US" dirty="0"/>
+              <a:t>ASSUMPTIONS:</a:t>
+            </a:r>
+          </a:p>
+          <a:p>
+            <a:r>
+              <a:rPr lang="en-US" dirty="0"/>
+              <a:t>&lt;=(sysinertia,0.005)</a:t>
+            </a:r>
+          </a:p>
+          <a:p>
+            <a:r>
+              <a:rPr lang="en-US" dirty="0"/>
+              <a:t>STEP(cmdup,5000,1)</a:t>
+            </a:r>
+          </a:p>
+          <a:p>
+            <a:r>
+              <a:rPr lang="en-US" dirty="0"/>
+              <a:t>REF(</a:t>
+            </a:r>
+            <a:r>
+              <a:rPr lang="en-US" dirty="0" err="1"/>
+              <a:t>cmdup</a:t>
+            </a:r>
+            <a:r>
+              <a:rPr lang="en-US" dirty="0"/>
+              <a:t>)</a:t>
+            </a:r>
+          </a:p>
+          <a:p>
+            <a:r>
+              <a:rPr lang="en-US" dirty="0"/>
+              <a:t>ASSERTIONS:</a:t>
+            </a:r>
+          </a:p>
+          <a:p>
+            <a:r>
+              <a:rPr lang="en-US" dirty="0"/>
+              <a:t>OVERSHOOT(motorspeed,1500)</a:t>
+            </a:r>
+          </a:p>
+          <a:p>
             <a:endParaRPr lang="en-US" dirty="0">
               <a:latin typeface="Lato" panose="020F0502020204030203" pitchFamily="34" charset="0"/>
               <a:ea typeface="Lato" panose="020F0502020204030203" pitchFamily="34" charset="0"/>
@@ -21694,6 +21824,14 @@
   <p:clrMapOvr>
     <a:masterClrMapping/>
   </p:clrMapOvr>
+  <mc:AlternateContent xmlns:mc="http://schemas.openxmlformats.org/markup-compatibility/2006">
+    <mc:Choice xmlns:p14="http://schemas.microsoft.com/office/powerpoint/2010/main" Requires="p14">
+      <p:transition spd="slow" p14:dur="2000"/>
+    </mc:Choice>
+    <mc:Fallback>
+      <p:transition spd="slow"/>
+    </mc:Fallback>
+  </mc:AlternateContent>
   <p:timing>
     <p:tnLst>
       <p:par>
@@ -21723,25 +21861,23 @@
       </p:grpSpPr>
       <p:sp>
         <p:nvSpPr>
-          <p:cNvPr id="6" name="Rectangle 5"/>
+          <p:cNvPr id="29" name="Right Arrow 28"/>
           <p:cNvSpPr/>
           <p:nvPr/>
         </p:nvSpPr>
         <p:spPr>
-          <a:xfrm>
-            <a:off x="0" y="6409155"/>
-            <a:ext cx="9144000" cy="448843"/>
-          </a:xfrm>
-          <a:prstGeom prst="rect">
+          <a:xfrm rot="10800000">
+            <a:off x="4860031" y="4742787"/>
+            <a:ext cx="1838235" cy="199507"/>
+          </a:xfrm>
+          <a:prstGeom prst="rightArrow">
             <a:avLst/>
           </a:prstGeom>
           <a:solidFill>
-            <a:schemeClr val="bg2"/>
+            <a:srgbClr val="FFCC66"/>
           </a:solidFill>
           <a:ln>
-            <a:solidFill>
-              <a:schemeClr val="bg2"/>
-            </a:solidFill>
+            <a:noFill/>
           </a:ln>
         </p:spPr>
         <p:style>
@@ -21771,229 +21907,29 @@
       </p:sp>
       <p:sp>
         <p:nvSpPr>
-          <p:cNvPr id="7" name="Date Placeholder 6"/>
-          <p:cNvSpPr>
-            <a:spLocks noGrp="1"/>
-          </p:cNvSpPr>
-          <p:nvPr>
-            <p:ph type="dt" sz="half" idx="10"/>
-          </p:nvPr>
-        </p:nvSpPr>
-        <p:spPr>
-          <a:xfrm>
-            <a:off x="1762839" y="6409155"/>
-            <a:ext cx="2061592" cy="448843"/>
-          </a:xfrm>
-        </p:spPr>
-        <p:txBody>
-          <a:bodyPr/>
-          <a:lstStyle/>
-          <a:p>
-            <a:pPr algn="ctr"/>
-            <a:fld id="{6C4E8271-70CA-4668-9C33-BE25780D6213}" type="datetime4">
-              <a:rPr lang="en-US" smtClean="0">
-                <a:solidFill>
-                  <a:schemeClr val="tx1"/>
-                </a:solidFill>
-                <a:latin typeface="Lato" panose="020F0502020204030203" pitchFamily="34" charset="0"/>
-                <a:ea typeface="Lato" panose="020F0502020204030203" pitchFamily="34" charset="0"/>
-                <a:cs typeface="Lato" panose="020F0502020204030203" pitchFamily="34" charset="0"/>
-              </a:rPr>
-              <a:t>July 4, 2017</a:t>
-            </a:fld>
-            <a:endParaRPr lang="en-US" dirty="0">
-              <a:solidFill>
-                <a:schemeClr val="tx1"/>
-              </a:solidFill>
-              <a:latin typeface="Lato" panose="020F0502020204030203" pitchFamily="34" charset="0"/>
-              <a:ea typeface="Lato" panose="020F0502020204030203" pitchFamily="34" charset="0"/>
-              <a:cs typeface="Lato" panose="020F0502020204030203" pitchFamily="34" charset="0"/>
-            </a:endParaRPr>
-          </a:p>
-        </p:txBody>
-      </p:sp>
-      <p:sp>
-        <p:nvSpPr>
-          <p:cNvPr id="8" name="Footer Placeholder 7"/>
-          <p:cNvSpPr>
-            <a:spLocks noGrp="1"/>
-          </p:cNvSpPr>
-          <p:nvPr>
-            <p:ph type="ftr" sz="quarter" idx="11"/>
-          </p:nvPr>
-        </p:nvSpPr>
-        <p:spPr>
-          <a:xfrm>
-            <a:off x="4427984" y="6409155"/>
-            <a:ext cx="2895600" cy="448843"/>
-          </a:xfrm>
-        </p:spPr>
-        <p:txBody>
-          <a:bodyPr/>
-          <a:lstStyle/>
-          <a:p>
-            <a:r>
-              <a:rPr lang="en-US" dirty="0" smtClean="0">
-                <a:solidFill>
-                  <a:schemeClr val="tx1"/>
-                </a:solidFill>
-                <a:latin typeface="Lato" panose="020F0502020204030203" pitchFamily="34" charset="0"/>
-                <a:ea typeface="Lato" panose="020F0502020204030203" pitchFamily="34" charset="0"/>
-                <a:cs typeface="Lato" panose="020F0502020204030203" pitchFamily="34" charset="0"/>
-              </a:rPr>
-              <a:t>United Technologies Research Center</a:t>
-            </a:r>
-            <a:endParaRPr lang="en-US" dirty="0">
-              <a:solidFill>
-                <a:schemeClr val="tx1"/>
-              </a:solidFill>
-              <a:latin typeface="Lato" panose="020F0502020204030203" pitchFamily="34" charset="0"/>
-              <a:ea typeface="Lato" panose="020F0502020204030203" pitchFamily="34" charset="0"/>
-              <a:cs typeface="Lato" panose="020F0502020204030203" pitchFamily="34" charset="0"/>
-            </a:endParaRPr>
-          </a:p>
-        </p:txBody>
-      </p:sp>
-      <p:sp>
-        <p:nvSpPr>
-          <p:cNvPr id="9" name="Slide Number Placeholder 8"/>
-          <p:cNvSpPr>
-            <a:spLocks noGrp="1"/>
-          </p:cNvSpPr>
-          <p:nvPr>
-            <p:ph type="sldNum" sz="quarter" idx="12"/>
-          </p:nvPr>
-        </p:nvSpPr>
-        <p:spPr>
-          <a:xfrm>
-            <a:off x="6553200" y="6409154"/>
-            <a:ext cx="2133600" cy="448845"/>
-          </a:xfrm>
-        </p:spPr>
-        <p:txBody>
-          <a:bodyPr/>
-          <a:lstStyle/>
-          <a:p>
-            <a:fld id="{77D5BC96-C262-44A9-A0BB-2BDA2E2D380A}" type="slidenum">
-              <a:rPr lang="en-US" smtClean="0">
-                <a:solidFill>
-                  <a:schemeClr val="tx1"/>
-                </a:solidFill>
-                <a:latin typeface="Lato" panose="020F0502020204030203" pitchFamily="34" charset="0"/>
-                <a:ea typeface="Lato" panose="020F0502020204030203" pitchFamily="34" charset="0"/>
-                <a:cs typeface="Lato" panose="020F0502020204030203" pitchFamily="34" charset="0"/>
-              </a:rPr>
-              <a:t>23</a:t>
-            </a:fld>
-            <a:endParaRPr lang="en-US" dirty="0">
-              <a:solidFill>
-                <a:schemeClr val="tx1"/>
-              </a:solidFill>
-              <a:latin typeface="Lato" panose="020F0502020204030203" pitchFamily="34" charset="0"/>
-              <a:ea typeface="Lato" panose="020F0502020204030203" pitchFamily="34" charset="0"/>
-              <a:cs typeface="Lato" panose="020F0502020204030203" pitchFamily="34" charset="0"/>
-            </a:endParaRPr>
-          </a:p>
-        </p:txBody>
-      </p:sp>
-      <p:sp>
-        <p:nvSpPr>
-          <p:cNvPr id="10" name="TextBox 9"/>
-          <p:cNvSpPr txBox="1"/>
-          <p:nvPr/>
-        </p:nvSpPr>
-        <p:spPr>
-          <a:xfrm>
-            <a:off x="395537" y="545134"/>
-            <a:ext cx="2398099" cy="461665"/>
-          </a:xfrm>
-          <a:prstGeom prst="rect">
-            <a:avLst/>
-          </a:prstGeom>
-          <a:noFill/>
-        </p:spPr>
-        <p:txBody>
-          <a:bodyPr wrap="square" rtlCol="0">
-            <a:spAutoFit/>
-          </a:bodyPr>
-          <a:lstStyle/>
-          <a:p>
-            <a:r>
-              <a:rPr lang="en-GB" sz="2400" b="1" dirty="0" smtClean="0">
-                <a:latin typeface="Lato Medium" panose="020F0502020204030203" pitchFamily="34" charset="0"/>
-                <a:ea typeface="Lato Medium" panose="020F0502020204030203" pitchFamily="34" charset="0"/>
-                <a:cs typeface="Lato Medium" panose="020F0502020204030203" pitchFamily="34" charset="0"/>
-              </a:rPr>
-              <a:t>Auto-generation</a:t>
-            </a:r>
-            <a:endParaRPr lang="en-US" sz="2400" b="1" dirty="0">
-              <a:latin typeface="Lato Medium" panose="020F0502020204030203" pitchFamily="34" charset="0"/>
-              <a:ea typeface="Lato Medium" panose="020F0502020204030203" pitchFamily="34" charset="0"/>
-              <a:cs typeface="Lato Medium" panose="020F0502020204030203" pitchFamily="34" charset="0"/>
-            </a:endParaRPr>
-          </a:p>
-        </p:txBody>
-      </p:sp>
-      <p:sp>
-        <p:nvSpPr>
-          <p:cNvPr id="11" name="TextBox 10"/>
-          <p:cNvSpPr txBox="1"/>
-          <p:nvPr/>
-        </p:nvSpPr>
-        <p:spPr>
-          <a:xfrm>
-            <a:off x="564638" y="6504111"/>
-            <a:ext cx="1029947" cy="276999"/>
-          </a:xfrm>
-          <a:prstGeom prst="rect">
-            <a:avLst/>
-          </a:prstGeom>
-          <a:noFill/>
-        </p:spPr>
-        <p:txBody>
-          <a:bodyPr wrap="square" rtlCol="0">
-            <a:spAutoFit/>
-          </a:bodyPr>
-          <a:lstStyle/>
-          <a:p>
-            <a:r>
-              <a:rPr lang="en-GB" sz="1200" dirty="0" smtClean="0">
-                <a:latin typeface="Lato" panose="020F0502020204030203" pitchFamily="34" charset="0"/>
-                <a:ea typeface="Lato" panose="020F0502020204030203" pitchFamily="34" charset="0"/>
-                <a:cs typeface="Lato" panose="020F0502020204030203" pitchFamily="34" charset="0"/>
-              </a:rPr>
-              <a:t>M.Celia</a:t>
-            </a:r>
-            <a:endParaRPr lang="en-US" sz="1200" dirty="0">
-              <a:latin typeface="Lato" panose="020F0502020204030203" pitchFamily="34" charset="0"/>
-              <a:ea typeface="Lato" panose="020F0502020204030203" pitchFamily="34" charset="0"/>
-              <a:cs typeface="Lato" panose="020F0502020204030203" pitchFamily="34" charset="0"/>
-            </a:endParaRPr>
-          </a:p>
-        </p:txBody>
-      </p:sp>
-      <p:sp>
-        <p:nvSpPr>
-          <p:cNvPr id="2" name="Rectangle 1"/>
+          <p:cNvPr id="5" name="Folded Corner 4"/>
           <p:cNvSpPr/>
           <p:nvPr/>
         </p:nvSpPr>
         <p:spPr>
-          <a:xfrm>
-            <a:off x="395537" y="1052736"/>
-            <a:ext cx="2398099" cy="45719"/>
-          </a:xfrm>
-          <a:prstGeom prst="rect">
-            <a:avLst/>
+          <a:xfrm rot="10800000">
+            <a:off x="6914292" y="4122768"/>
+            <a:ext cx="792088" cy="1080120"/>
+          </a:xfrm>
+          <a:prstGeom prst="foldedCorner">
+            <a:avLst>
+              <a:gd name="adj" fmla="val 28609"/>
+            </a:avLst>
           </a:prstGeom>
           <a:solidFill>
-            <a:schemeClr val="tx2">
-              <a:lumMod val="60000"/>
-              <a:lumOff val="40000"/>
+            <a:schemeClr val="bg1">
+              <a:lumMod val="95000"/>
             </a:schemeClr>
           </a:solidFill>
-          <a:ln>
-            <a:noFill/>
+          <a:ln w="9525">
+            <a:solidFill>
+              <a:schemeClr val="tx1"/>
+            </a:solidFill>
           </a:ln>
         </p:spPr>
         <p:style>
@@ -22023,14 +21959,189 @@
       </p:sp>
       <p:sp>
         <p:nvSpPr>
-          <p:cNvPr id="13" name="TextBox 12"/>
+          <p:cNvPr id="6" name="Rectangle 5"/>
+          <p:cNvSpPr/>
+          <p:nvPr/>
+        </p:nvSpPr>
+        <p:spPr>
+          <a:xfrm>
+            <a:off x="0" y="6409155"/>
+            <a:ext cx="9144000" cy="448843"/>
+          </a:xfrm>
+          <a:prstGeom prst="rect">
+            <a:avLst/>
+          </a:prstGeom>
+          <a:solidFill>
+            <a:schemeClr val="bg2"/>
+          </a:solidFill>
+          <a:ln>
+            <a:solidFill>
+              <a:schemeClr val="bg2"/>
+            </a:solidFill>
+          </a:ln>
+        </p:spPr>
+        <p:style>
+          <a:lnRef idx="2">
+            <a:schemeClr val="accent1">
+              <a:shade val="50000"/>
+            </a:schemeClr>
+          </a:lnRef>
+          <a:fillRef idx="1">
+            <a:schemeClr val="accent1"/>
+          </a:fillRef>
+          <a:effectRef idx="0">
+            <a:schemeClr val="accent1"/>
+          </a:effectRef>
+          <a:fontRef idx="minor">
+            <a:schemeClr val="lt1"/>
+          </a:fontRef>
+        </p:style>
+        <p:txBody>
+          <a:bodyPr rtlCol="0" anchor="ctr"/>
+          <a:lstStyle/>
+          <a:p>
+            <a:pPr algn="ctr"/>
+            <a:endParaRPr lang="en-US"/>
+          </a:p>
+        </p:txBody>
+      </p:sp>
+      <p:sp>
+        <p:nvSpPr>
+          <p:cNvPr id="7" name="Date Placeholder 6"/>
+          <p:cNvSpPr>
+            <a:spLocks noGrp="1"/>
+          </p:cNvSpPr>
+          <p:nvPr>
+            <p:ph type="dt" sz="half" idx="10"/>
+          </p:nvPr>
+        </p:nvSpPr>
+        <p:spPr>
+          <a:xfrm>
+            <a:off x="1762839" y="6409155"/>
+            <a:ext cx="2061592" cy="448843"/>
+          </a:xfrm>
+        </p:spPr>
+        <p:txBody>
+          <a:bodyPr/>
+          <a:lstStyle/>
+          <a:p>
+            <a:pPr algn="ctr"/>
+            <a:fld id="{6C4E8271-70CA-4668-9C33-BE25780D6213}" type="datetime4">
+              <a:rPr lang="en-US" smtClean="0">
+                <a:solidFill>
+                  <a:schemeClr val="tx1"/>
+                </a:solidFill>
+                <a:latin typeface="Lato" panose="020F0502020204030203" pitchFamily="34" charset="0"/>
+                <a:ea typeface="Lato" panose="020F0502020204030203" pitchFamily="34" charset="0"/>
+                <a:cs typeface="Lato" panose="020F0502020204030203" pitchFamily="34" charset="0"/>
+              </a:rPr>
+              <a:t>July 5, 2017</a:t>
+            </a:fld>
+            <a:endParaRPr lang="en-US" dirty="0">
+              <a:solidFill>
+                <a:schemeClr val="tx1"/>
+              </a:solidFill>
+              <a:latin typeface="Lato" panose="020F0502020204030203" pitchFamily="34" charset="0"/>
+              <a:ea typeface="Lato" panose="020F0502020204030203" pitchFamily="34" charset="0"/>
+              <a:cs typeface="Lato" panose="020F0502020204030203" pitchFamily="34" charset="0"/>
+            </a:endParaRPr>
+          </a:p>
+        </p:txBody>
+      </p:sp>
+      <p:sp>
+        <p:nvSpPr>
+          <p:cNvPr id="8" name="Footer Placeholder 7"/>
+          <p:cNvSpPr>
+            <a:spLocks noGrp="1"/>
+          </p:cNvSpPr>
+          <p:nvPr>
+            <p:ph type="ftr" sz="quarter" idx="11"/>
+          </p:nvPr>
+        </p:nvSpPr>
+        <p:spPr>
+          <a:xfrm>
+            <a:off x="4427984" y="6409155"/>
+            <a:ext cx="2895600" cy="448843"/>
+          </a:xfrm>
+        </p:spPr>
+        <p:txBody>
+          <a:bodyPr/>
+          <a:lstStyle/>
+          <a:p>
+            <a:r>
+              <a:rPr lang="en-US" dirty="0" smtClean="0">
+                <a:solidFill>
+                  <a:schemeClr val="tx1"/>
+                </a:solidFill>
+                <a:latin typeface="Lato" panose="020F0502020204030203" pitchFamily="34" charset="0"/>
+                <a:ea typeface="Lato" panose="020F0502020204030203" pitchFamily="34" charset="0"/>
+                <a:cs typeface="Lato" panose="020F0502020204030203" pitchFamily="34" charset="0"/>
+              </a:rPr>
+              <a:t>United Technologies Research Center</a:t>
+            </a:r>
+            <a:endParaRPr lang="en-US" dirty="0">
+              <a:solidFill>
+                <a:schemeClr val="tx1"/>
+              </a:solidFill>
+              <a:latin typeface="Lato" panose="020F0502020204030203" pitchFamily="34" charset="0"/>
+              <a:ea typeface="Lato" panose="020F0502020204030203" pitchFamily="34" charset="0"/>
+              <a:cs typeface="Lato" panose="020F0502020204030203" pitchFamily="34" charset="0"/>
+            </a:endParaRPr>
+          </a:p>
+        </p:txBody>
+      </p:sp>
+      <p:sp>
+        <p:nvSpPr>
+          <p:cNvPr id="9" name="Slide Number Placeholder 8"/>
+          <p:cNvSpPr>
+            <a:spLocks noGrp="1"/>
+          </p:cNvSpPr>
+          <p:nvPr>
+            <p:ph type="sldNum" sz="quarter" idx="12"/>
+          </p:nvPr>
+        </p:nvSpPr>
+        <p:spPr>
+          <a:xfrm>
+            <a:off x="6553200" y="6409154"/>
+            <a:ext cx="2133600" cy="448845"/>
+          </a:xfrm>
+        </p:spPr>
+        <p:txBody>
+          <a:bodyPr/>
+          <a:lstStyle/>
+          <a:p>
+            <a:fld id="{77D5BC96-C262-44A9-A0BB-2BDA2E2D380A}" type="slidenum">
+              <a:rPr lang="en-US" smtClean="0">
+                <a:solidFill>
+                  <a:schemeClr val="tx1"/>
+                </a:solidFill>
+                <a:latin typeface="Lato" panose="020F0502020204030203" pitchFamily="34" charset="0"/>
+                <a:ea typeface="Lato" panose="020F0502020204030203" pitchFamily="34" charset="0"/>
+                <a:cs typeface="Lato" panose="020F0502020204030203" pitchFamily="34" charset="0"/>
+              </a:rPr>
+              <a:t>23</a:t>
+            </a:fld>
+            <a:endParaRPr lang="en-US" dirty="0">
+              <a:solidFill>
+                <a:schemeClr val="tx1"/>
+              </a:solidFill>
+              <a:latin typeface="Lato" panose="020F0502020204030203" pitchFamily="34" charset="0"/>
+              <a:ea typeface="Lato" panose="020F0502020204030203" pitchFamily="34" charset="0"/>
+              <a:cs typeface="Lato" panose="020F0502020204030203" pitchFamily="34" charset="0"/>
+            </a:endParaRPr>
+          </a:p>
+        </p:txBody>
+      </p:sp>
+      <p:sp>
+        <p:nvSpPr>
+          <p:cNvPr id="10" name="TextBox 9"/>
           <p:cNvSpPr txBox="1"/>
           <p:nvPr/>
         </p:nvSpPr>
         <p:spPr>
           <a:xfrm>
-            <a:off x="395536" y="1231131"/>
-            <a:ext cx="8496943" cy="369332"/>
+            <a:off x="395537" y="545134"/>
+            <a:ext cx="2398099" cy="461665"/>
           </a:xfrm>
           <a:prstGeom prst="rect">
             <a:avLst/>
@@ -22044,18 +22155,105 @@
           <a:lstStyle/>
           <a:p>
             <a:r>
-              <a:rPr lang="en-GB" dirty="0" smtClean="0">
-                <a:latin typeface="Lato" panose="020F0502020204030203" pitchFamily="34" charset="0"/>
-                <a:ea typeface="Lato" panose="020F0502020204030203" pitchFamily="34" charset="0"/>
-                <a:cs typeface="Lato" panose="020F0502020204030203" pitchFamily="34" charset="0"/>
-              </a:rPr>
-              <a:t>text</a:t>
-            </a:r>
-            <a:endParaRPr lang="en-US" dirty="0">
+              <a:rPr lang="en-GB" sz="2400" b="1" dirty="0" smtClean="0">
+                <a:latin typeface="Lato Medium" panose="020F0502020204030203" pitchFamily="34" charset="0"/>
+                <a:ea typeface="Lato Medium" panose="020F0502020204030203" pitchFamily="34" charset="0"/>
+                <a:cs typeface="Lato Medium" panose="020F0502020204030203" pitchFamily="34" charset="0"/>
+              </a:rPr>
+              <a:t>Auto-generation</a:t>
+            </a:r>
+            <a:endParaRPr lang="en-US" sz="2400" b="1" dirty="0">
+              <a:latin typeface="Lato Medium" panose="020F0502020204030203" pitchFamily="34" charset="0"/>
+              <a:ea typeface="Lato Medium" panose="020F0502020204030203" pitchFamily="34" charset="0"/>
+              <a:cs typeface="Lato Medium" panose="020F0502020204030203" pitchFamily="34" charset="0"/>
+            </a:endParaRPr>
+          </a:p>
+        </p:txBody>
+      </p:sp>
+      <p:sp>
+        <p:nvSpPr>
+          <p:cNvPr id="11" name="TextBox 10"/>
+          <p:cNvSpPr txBox="1"/>
+          <p:nvPr/>
+        </p:nvSpPr>
+        <p:spPr>
+          <a:xfrm>
+            <a:off x="564638" y="6504111"/>
+            <a:ext cx="1029947" cy="276999"/>
+          </a:xfrm>
+          <a:prstGeom prst="rect">
+            <a:avLst/>
+          </a:prstGeom>
+          <a:noFill/>
+        </p:spPr>
+        <p:txBody>
+          <a:bodyPr wrap="square" rtlCol="0">
+            <a:spAutoFit/>
+          </a:bodyPr>
+          <a:lstStyle/>
+          <a:p>
+            <a:r>
+              <a:rPr lang="en-GB" sz="1200" dirty="0" smtClean="0">
+                <a:latin typeface="Lato" panose="020F0502020204030203" pitchFamily="34" charset="0"/>
+                <a:ea typeface="Lato" panose="020F0502020204030203" pitchFamily="34" charset="0"/>
+                <a:cs typeface="Lato" panose="020F0502020204030203" pitchFamily="34" charset="0"/>
+              </a:rPr>
+              <a:t>M.Celia</a:t>
+            </a:r>
+            <a:endParaRPr lang="en-US" sz="1200" dirty="0">
               <a:latin typeface="Lato" panose="020F0502020204030203" pitchFamily="34" charset="0"/>
               <a:ea typeface="Lato" panose="020F0502020204030203" pitchFamily="34" charset="0"/>
               <a:cs typeface="Lato" panose="020F0502020204030203" pitchFamily="34" charset="0"/>
             </a:endParaRPr>
+          </a:p>
+        </p:txBody>
+      </p:sp>
+      <p:sp>
+        <p:nvSpPr>
+          <p:cNvPr id="2" name="Rectangle 1"/>
+          <p:cNvSpPr/>
+          <p:nvPr/>
+        </p:nvSpPr>
+        <p:spPr>
+          <a:xfrm>
+            <a:off x="395537" y="1052736"/>
+            <a:ext cx="2398099" cy="45719"/>
+          </a:xfrm>
+          <a:prstGeom prst="rect">
+            <a:avLst/>
+          </a:prstGeom>
+          <a:solidFill>
+            <a:schemeClr val="tx2">
+              <a:lumMod val="60000"/>
+              <a:lumOff val="40000"/>
+            </a:schemeClr>
+          </a:solidFill>
+          <a:ln>
+            <a:noFill/>
+          </a:ln>
+        </p:spPr>
+        <p:style>
+          <a:lnRef idx="2">
+            <a:schemeClr val="accent1">
+              <a:shade val="50000"/>
+            </a:schemeClr>
+          </a:lnRef>
+          <a:fillRef idx="1">
+            <a:schemeClr val="accent1"/>
+          </a:fillRef>
+          <a:effectRef idx="0">
+            <a:schemeClr val="accent1"/>
+          </a:effectRef>
+          <a:fontRef idx="minor">
+            <a:schemeClr val="lt1"/>
+          </a:fontRef>
+        </p:style>
+        <p:txBody>
+          <a:bodyPr rtlCol="0" anchor="ctr"/>
+          <a:lstStyle/>
+          <a:p>
+            <a:pPr algn="ctr"/>
+            <a:endParaRPr lang="en-US"/>
           </a:p>
         </p:txBody>
       </p:sp>
@@ -22120,7 +22318,7 @@
         </p:blipFill>
         <p:spPr bwMode="auto">
           <a:xfrm>
-            <a:off x="5051534" y="2060848"/>
+            <a:off x="5420125" y="1408341"/>
             <a:ext cx="3132349" cy="1943963"/>
           </a:xfrm>
           <a:prstGeom prst="rect">
@@ -22153,9 +22351,9 @@
       </p:pic>
       <p:pic>
         <p:nvPicPr>
-          <p:cNvPr id="12" name="Picture 11"/>
+          <p:cNvPr id="1026" name="Picture 2"/>
           <p:cNvPicPr>
-            <a:picLocks noChangeAspect="1"/>
+            <a:picLocks noChangeAspect="1" noChangeArrowheads="1"/>
           </p:cNvPicPr>
           <p:nvPr/>
         </p:nvPicPr>
@@ -22167,20 +22365,619 @@
               </a:ext>
             </a:extLst>
           </a:blip>
+          <a:srcRect/>
           <a:stretch>
             <a:fillRect/>
           </a:stretch>
         </p:blipFill>
-        <p:spPr>
-          <a:xfrm>
-            <a:off x="395537" y="2348880"/>
-            <a:ext cx="4486896" cy="2888218"/>
+        <p:spPr bwMode="auto">
+          <a:xfrm>
+            <a:off x="899593" y="1126798"/>
+            <a:ext cx="3960439" cy="2381238"/>
           </a:xfrm>
           <a:prstGeom prst="rect">
             <a:avLst/>
           </a:prstGeom>
+          <a:noFill/>
+          <a:ln>
+            <a:noFill/>
+          </a:ln>
+          <a:extLst>
+            <a:ext uri="{909E8E84-426E-40DD-AFC4-6F175D3DCCD1}">
+              <a14:hiddenFill xmlns:a14="http://schemas.microsoft.com/office/drawing/2010/main">
+                <a:solidFill>
+                  <a:schemeClr val="accent1"/>
+                </a:solidFill>
+              </a14:hiddenFill>
+            </a:ext>
+            <a:ext uri="{91240B29-F687-4F45-9708-019B960494DF}">
+              <a14:hiddenLine xmlns:a14="http://schemas.microsoft.com/office/drawing/2010/main" w="9525">
+                <a:solidFill>
+                  <a:schemeClr val="tx1"/>
+                </a:solidFill>
+                <a:miter lim="800000"/>
+                <a:headEnd/>
+                <a:tailEnd/>
+              </a14:hiddenLine>
+            </a:ext>
+          </a:extLst>
         </p:spPr>
       </p:pic>
+      <p:sp>
+        <p:nvSpPr>
+          <p:cNvPr id="3" name="Rectangle 2"/>
+          <p:cNvSpPr/>
+          <p:nvPr/>
+        </p:nvSpPr>
+        <p:spPr>
+          <a:xfrm>
+            <a:off x="899593" y="1126797"/>
+            <a:ext cx="3960439" cy="2381239"/>
+          </a:xfrm>
+          <a:prstGeom prst="rect">
+            <a:avLst/>
+          </a:prstGeom>
+          <a:noFill/>
+          <a:ln>
+            <a:solidFill>
+              <a:srgbClr val="FFC000"/>
+            </a:solidFill>
+          </a:ln>
+        </p:spPr>
+        <p:style>
+          <a:lnRef idx="2">
+            <a:schemeClr val="accent1">
+              <a:shade val="50000"/>
+            </a:schemeClr>
+          </a:lnRef>
+          <a:fillRef idx="1">
+            <a:schemeClr val="accent1"/>
+          </a:fillRef>
+          <a:effectRef idx="0">
+            <a:schemeClr val="accent1"/>
+          </a:effectRef>
+          <a:fontRef idx="minor">
+            <a:schemeClr val="lt1"/>
+          </a:fontRef>
+        </p:style>
+        <p:txBody>
+          <a:bodyPr rtlCol="0" anchor="ctr"/>
+          <a:lstStyle/>
+          <a:p>
+            <a:pPr algn="ctr"/>
+            <a:endParaRPr lang="en-US"/>
+          </a:p>
+        </p:txBody>
+      </p:sp>
+      <p:sp>
+        <p:nvSpPr>
+          <p:cNvPr id="15" name="Rectangle 14"/>
+          <p:cNvSpPr/>
+          <p:nvPr/>
+        </p:nvSpPr>
+        <p:spPr>
+          <a:xfrm>
+            <a:off x="5420125" y="1408341"/>
+            <a:ext cx="3132349" cy="1943963"/>
+          </a:xfrm>
+          <a:prstGeom prst="rect">
+            <a:avLst/>
+          </a:prstGeom>
+          <a:noFill/>
+          <a:ln>
+            <a:solidFill>
+              <a:srgbClr val="FFC000"/>
+            </a:solidFill>
+          </a:ln>
+        </p:spPr>
+        <p:style>
+          <a:lnRef idx="2">
+            <a:schemeClr val="accent1">
+              <a:shade val="50000"/>
+            </a:schemeClr>
+          </a:lnRef>
+          <a:fillRef idx="1">
+            <a:schemeClr val="accent1"/>
+          </a:fillRef>
+          <a:effectRef idx="0">
+            <a:schemeClr val="accent1"/>
+          </a:effectRef>
+          <a:fontRef idx="minor">
+            <a:schemeClr val="lt1"/>
+          </a:fontRef>
+        </p:style>
+        <p:txBody>
+          <a:bodyPr rtlCol="0" anchor="ctr"/>
+          <a:lstStyle/>
+          <a:p>
+            <a:pPr algn="ctr"/>
+            <a:endParaRPr lang="en-US"/>
+          </a:p>
+        </p:txBody>
+      </p:sp>
+      <p:pic>
+        <p:nvPicPr>
+          <p:cNvPr id="4" name="Picture 3"/>
+          <p:cNvPicPr>
+            <a:picLocks noChangeAspect="1"/>
+          </p:cNvPicPr>
+          <p:nvPr/>
+        </p:nvPicPr>
+        <p:blipFill>
+          <a:blip r:embed="rId5" cstate="print">
+            <a:extLst>
+              <a:ext uri="{28A0092B-C50C-407E-A947-70E740481C1C}">
+                <a14:useLocalDpi xmlns:a14="http://schemas.microsoft.com/office/drawing/2010/main" val="0"/>
+              </a:ext>
+            </a:extLst>
+          </a:blip>
+          <a:stretch>
+            <a:fillRect/>
+          </a:stretch>
+        </p:blipFill>
+        <p:spPr>
+          <a:xfrm>
+            <a:off x="6986300" y="4266784"/>
+            <a:ext cx="1228202" cy="675511"/>
+          </a:xfrm>
+          <a:prstGeom prst="rect">
+            <a:avLst/>
+          </a:prstGeom>
+        </p:spPr>
+      </p:pic>
+      <p:sp>
+        <p:nvSpPr>
+          <p:cNvPr id="16" name="TextBox 15"/>
+          <p:cNvSpPr txBox="1"/>
+          <p:nvPr/>
+        </p:nvSpPr>
+        <p:spPr>
+          <a:xfrm>
+            <a:off x="6626259" y="5202889"/>
+            <a:ext cx="1368151" cy="415498"/>
+          </a:xfrm>
+          <a:prstGeom prst="rect">
+            <a:avLst/>
+          </a:prstGeom>
+          <a:noFill/>
+        </p:spPr>
+        <p:txBody>
+          <a:bodyPr wrap="square" rtlCol="0">
+            <a:spAutoFit/>
+          </a:bodyPr>
+          <a:lstStyle/>
+          <a:p>
+            <a:pPr algn="ctr"/>
+            <a:r>
+              <a:rPr lang="en-GB" sz="1050" dirty="0" smtClean="0"/>
+              <a:t>MDS_requirement_augogen.m</a:t>
+            </a:r>
+            <a:endParaRPr lang="en-US" dirty="0"/>
+          </a:p>
+        </p:txBody>
+      </p:sp>
+      <p:sp>
+        <p:nvSpPr>
+          <p:cNvPr id="19" name="Rectangle 18"/>
+          <p:cNvSpPr/>
+          <p:nvPr/>
+        </p:nvSpPr>
+        <p:spPr>
+          <a:xfrm>
+            <a:off x="6698267" y="4078840"/>
+            <a:ext cx="1224137" cy="1539547"/>
+          </a:xfrm>
+          <a:prstGeom prst="rect">
+            <a:avLst/>
+          </a:prstGeom>
+          <a:noFill/>
+          <a:ln>
+            <a:solidFill>
+              <a:srgbClr val="FFC000"/>
+            </a:solidFill>
+          </a:ln>
+        </p:spPr>
+        <p:style>
+          <a:lnRef idx="2">
+            <a:schemeClr val="accent1">
+              <a:shade val="50000"/>
+            </a:schemeClr>
+          </a:lnRef>
+          <a:fillRef idx="1">
+            <a:schemeClr val="accent1"/>
+          </a:fillRef>
+          <a:effectRef idx="0">
+            <a:schemeClr val="accent1"/>
+          </a:effectRef>
+          <a:fontRef idx="minor">
+            <a:schemeClr val="lt1"/>
+          </a:fontRef>
+        </p:style>
+        <p:txBody>
+          <a:bodyPr rtlCol="0" anchor="ctr"/>
+          <a:lstStyle/>
+          <a:p>
+            <a:pPr algn="ctr"/>
+            <a:endParaRPr lang="en-US"/>
+          </a:p>
+        </p:txBody>
+      </p:sp>
+      <p:pic>
+        <p:nvPicPr>
+          <p:cNvPr id="1027" name="Picture 3"/>
+          <p:cNvPicPr>
+            <a:picLocks noChangeAspect="1" noChangeArrowheads="1"/>
+          </p:cNvPicPr>
+          <p:nvPr/>
+        </p:nvPicPr>
+        <p:blipFill>
+          <a:blip r:embed="rId6">
+            <a:extLst>
+              <a:ext uri="{28A0092B-C50C-407E-A947-70E740481C1C}">
+                <a14:useLocalDpi xmlns:a14="http://schemas.microsoft.com/office/drawing/2010/main" val="0"/>
+              </a:ext>
+            </a:extLst>
+          </a:blip>
+          <a:srcRect/>
+          <a:stretch>
+            <a:fillRect/>
+          </a:stretch>
+        </p:blipFill>
+        <p:spPr bwMode="auto">
+          <a:xfrm>
+            <a:off x="411719" y="3717032"/>
+            <a:ext cx="4448313" cy="2467864"/>
+          </a:xfrm>
+          <a:prstGeom prst="rect">
+            <a:avLst/>
+          </a:prstGeom>
+          <a:noFill/>
+          <a:ln>
+            <a:noFill/>
+          </a:ln>
+          <a:extLst>
+            <a:ext uri="{909E8E84-426E-40DD-AFC4-6F175D3DCCD1}">
+              <a14:hiddenFill xmlns:a14="http://schemas.microsoft.com/office/drawing/2010/main">
+                <a:solidFill>
+                  <a:schemeClr val="accent1"/>
+                </a:solidFill>
+              </a14:hiddenFill>
+            </a:ext>
+            <a:ext uri="{91240B29-F687-4F45-9708-019B960494DF}">
+              <a14:hiddenLine xmlns:a14="http://schemas.microsoft.com/office/drawing/2010/main" w="9525">
+                <a:solidFill>
+                  <a:schemeClr val="tx1"/>
+                </a:solidFill>
+                <a:miter lim="800000"/>
+                <a:headEnd/>
+                <a:tailEnd/>
+              </a14:hiddenLine>
+            </a:ext>
+          </a:extLst>
+        </p:spPr>
+      </p:pic>
+      <p:sp>
+        <p:nvSpPr>
+          <p:cNvPr id="17" name="Flowchart: Process 16"/>
+          <p:cNvSpPr/>
+          <p:nvPr/>
+        </p:nvSpPr>
+        <p:spPr>
+          <a:xfrm>
+            <a:off x="1594587" y="3861048"/>
+            <a:ext cx="601149" cy="648072"/>
+          </a:xfrm>
+          <a:prstGeom prst="flowChartProcess">
+            <a:avLst/>
+          </a:prstGeom>
+          <a:noFill/>
+          <a:ln>
+            <a:solidFill>
+              <a:srgbClr val="00B0F0"/>
+            </a:solidFill>
+          </a:ln>
+        </p:spPr>
+        <p:style>
+          <a:lnRef idx="2">
+            <a:schemeClr val="accent1">
+              <a:shade val="50000"/>
+            </a:schemeClr>
+          </a:lnRef>
+          <a:fillRef idx="1">
+            <a:schemeClr val="accent1"/>
+          </a:fillRef>
+          <a:effectRef idx="0">
+            <a:schemeClr val="accent1"/>
+          </a:effectRef>
+          <a:fontRef idx="minor">
+            <a:schemeClr val="lt1"/>
+          </a:fontRef>
+        </p:style>
+        <p:txBody>
+          <a:bodyPr rtlCol="0" anchor="ctr"/>
+          <a:lstStyle/>
+          <a:p>
+            <a:pPr algn="ctr"/>
+            <a:endParaRPr lang="en-US"/>
+          </a:p>
+        </p:txBody>
+      </p:sp>
+      <p:sp>
+        <p:nvSpPr>
+          <p:cNvPr id="22" name="Rectangle 21"/>
+          <p:cNvSpPr/>
+          <p:nvPr/>
+        </p:nvSpPr>
+        <p:spPr>
+          <a:xfrm>
+            <a:off x="411719" y="3717033"/>
+            <a:ext cx="4448313" cy="2467863"/>
+          </a:xfrm>
+          <a:prstGeom prst="rect">
+            <a:avLst/>
+          </a:prstGeom>
+          <a:noFill/>
+          <a:ln>
+            <a:solidFill>
+              <a:srgbClr val="FFC000"/>
+            </a:solidFill>
+          </a:ln>
+        </p:spPr>
+        <p:style>
+          <a:lnRef idx="2">
+            <a:schemeClr val="accent1">
+              <a:shade val="50000"/>
+            </a:schemeClr>
+          </a:lnRef>
+          <a:fillRef idx="1">
+            <a:schemeClr val="accent1"/>
+          </a:fillRef>
+          <a:effectRef idx="0">
+            <a:schemeClr val="accent1"/>
+          </a:effectRef>
+          <a:fontRef idx="minor">
+            <a:schemeClr val="lt1"/>
+          </a:fontRef>
+        </p:style>
+        <p:txBody>
+          <a:bodyPr rtlCol="0" anchor="ctr"/>
+          <a:lstStyle/>
+          <a:p>
+            <a:pPr algn="ctr"/>
+            <a:endParaRPr lang="en-US"/>
+          </a:p>
+        </p:txBody>
+      </p:sp>
+      <p:pic>
+        <p:nvPicPr>
+          <p:cNvPr id="1028" name="Picture 4"/>
+          <p:cNvPicPr>
+            <a:picLocks noChangeAspect="1" noChangeArrowheads="1"/>
+          </p:cNvPicPr>
+          <p:nvPr/>
+        </p:nvPicPr>
+        <p:blipFill>
+          <a:blip r:embed="rId7" cstate="print">
+            <a:extLst>
+              <a:ext uri="{28A0092B-C50C-407E-A947-70E740481C1C}">
+                <a14:useLocalDpi xmlns:a14="http://schemas.microsoft.com/office/drawing/2010/main" val="0"/>
+              </a:ext>
+            </a:extLst>
+          </a:blip>
+          <a:srcRect/>
+          <a:stretch>
+            <a:fillRect/>
+          </a:stretch>
+        </p:blipFill>
+        <p:spPr bwMode="auto">
+          <a:xfrm>
+            <a:off x="2791328" y="3614681"/>
+            <a:ext cx="3092383" cy="2467863"/>
+          </a:xfrm>
+          <a:prstGeom prst="rect">
+            <a:avLst/>
+          </a:prstGeom>
+          <a:noFill/>
+          <a:ln>
+            <a:noFill/>
+          </a:ln>
+          <a:extLst>
+            <a:ext uri="{909E8E84-426E-40DD-AFC4-6F175D3DCCD1}">
+              <a14:hiddenFill xmlns:a14="http://schemas.microsoft.com/office/drawing/2010/main">
+                <a:solidFill>
+                  <a:schemeClr val="accent1"/>
+                </a:solidFill>
+              </a14:hiddenFill>
+            </a:ext>
+            <a:ext uri="{91240B29-F687-4F45-9708-019B960494DF}">
+              <a14:hiddenLine xmlns:a14="http://schemas.microsoft.com/office/drawing/2010/main" w="9525">
+                <a:solidFill>
+                  <a:schemeClr val="tx1"/>
+                </a:solidFill>
+                <a:miter lim="800000"/>
+                <a:headEnd/>
+                <a:tailEnd/>
+              </a14:hiddenLine>
+            </a:ext>
+          </a:extLst>
+        </p:spPr>
+      </p:pic>
+      <p:sp>
+        <p:nvSpPr>
+          <p:cNvPr id="18" name="Rectangle 17"/>
+          <p:cNvSpPr/>
+          <p:nvPr/>
+        </p:nvSpPr>
+        <p:spPr>
+          <a:xfrm>
+            <a:off x="2791328" y="3614681"/>
+            <a:ext cx="3092383" cy="2467863"/>
+          </a:xfrm>
+          <a:prstGeom prst="rect">
+            <a:avLst/>
+          </a:prstGeom>
+          <a:noFill/>
+          <a:ln>
+            <a:solidFill>
+              <a:srgbClr val="00B0F0"/>
+            </a:solidFill>
+          </a:ln>
+        </p:spPr>
+        <p:style>
+          <a:lnRef idx="2">
+            <a:schemeClr val="accent1">
+              <a:shade val="50000"/>
+            </a:schemeClr>
+          </a:lnRef>
+          <a:fillRef idx="1">
+            <a:schemeClr val="accent1"/>
+          </a:fillRef>
+          <a:effectRef idx="0">
+            <a:schemeClr val="accent1"/>
+          </a:effectRef>
+          <a:fontRef idx="minor">
+            <a:schemeClr val="lt1"/>
+          </a:fontRef>
+        </p:style>
+        <p:txBody>
+          <a:bodyPr rtlCol="0" anchor="ctr"/>
+          <a:lstStyle/>
+          <a:p>
+            <a:pPr algn="ctr"/>
+            <a:endParaRPr lang="en-US"/>
+          </a:p>
+        </p:txBody>
+      </p:sp>
+      <p:cxnSp>
+        <p:nvCxnSpPr>
+          <p:cNvPr id="21" name="Straight Arrow Connector 20"/>
+          <p:cNvCxnSpPr>
+            <a:stCxn id="17" idx="3"/>
+          </p:cNvCxnSpPr>
+          <p:nvPr/>
+        </p:nvCxnSpPr>
+        <p:spPr>
+          <a:xfrm>
+            <a:off x="2195736" y="4185084"/>
+            <a:ext cx="595592" cy="108012"/>
+          </a:xfrm>
+          <a:prstGeom prst="straightConnector1">
+            <a:avLst/>
+          </a:prstGeom>
+          <a:ln w="12700">
+            <a:solidFill>
+              <a:srgbClr val="00B0F0"/>
+            </a:solidFill>
+            <a:tailEnd type="arrow"/>
+          </a:ln>
+        </p:spPr>
+        <p:style>
+          <a:lnRef idx="1">
+            <a:schemeClr val="accent1"/>
+          </a:lnRef>
+          <a:fillRef idx="0">
+            <a:schemeClr val="accent1"/>
+          </a:fillRef>
+          <a:effectRef idx="0">
+            <a:schemeClr val="accent1"/>
+          </a:effectRef>
+          <a:fontRef idx="minor">
+            <a:schemeClr val="tx1"/>
+          </a:fontRef>
+        </p:style>
+      </p:cxnSp>
+      <p:sp>
+        <p:nvSpPr>
+          <p:cNvPr id="23" name="Right Arrow 22"/>
+          <p:cNvSpPr/>
+          <p:nvPr/>
+        </p:nvSpPr>
+        <p:spPr>
+          <a:xfrm>
+            <a:off x="4860032" y="2380322"/>
+            <a:ext cx="560093" cy="184582"/>
+          </a:xfrm>
+          <a:prstGeom prst="rightArrow">
+            <a:avLst/>
+          </a:prstGeom>
+          <a:solidFill>
+            <a:srgbClr val="FFCC66"/>
+          </a:solidFill>
+          <a:ln>
+            <a:noFill/>
+          </a:ln>
+        </p:spPr>
+        <p:style>
+          <a:lnRef idx="2">
+            <a:schemeClr val="accent1">
+              <a:shade val="50000"/>
+            </a:schemeClr>
+          </a:lnRef>
+          <a:fillRef idx="1">
+            <a:schemeClr val="accent1"/>
+          </a:fillRef>
+          <a:effectRef idx="0">
+            <a:schemeClr val="accent1"/>
+          </a:effectRef>
+          <a:fontRef idx="minor">
+            <a:schemeClr val="lt1"/>
+          </a:fontRef>
+        </p:style>
+        <p:txBody>
+          <a:bodyPr rtlCol="0" anchor="ctr"/>
+          <a:lstStyle/>
+          <a:p>
+            <a:pPr algn="ctr"/>
+            <a:endParaRPr lang="en-US"/>
+          </a:p>
+        </p:txBody>
+      </p:sp>
+      <p:sp>
+        <p:nvSpPr>
+          <p:cNvPr id="28" name="Right Arrow 27"/>
+          <p:cNvSpPr/>
+          <p:nvPr/>
+        </p:nvSpPr>
+        <p:spPr>
+          <a:xfrm rot="5400000">
+            <a:off x="6903077" y="3623283"/>
+            <a:ext cx="726537" cy="184582"/>
+          </a:xfrm>
+          <a:prstGeom prst="rightArrow">
+            <a:avLst/>
+          </a:prstGeom>
+          <a:solidFill>
+            <a:srgbClr val="FFCC66"/>
+          </a:solidFill>
+          <a:ln>
+            <a:noFill/>
+          </a:ln>
+        </p:spPr>
+        <p:style>
+          <a:lnRef idx="2">
+            <a:schemeClr val="accent1">
+              <a:shade val="50000"/>
+            </a:schemeClr>
+          </a:lnRef>
+          <a:fillRef idx="1">
+            <a:schemeClr val="accent1"/>
+          </a:fillRef>
+          <a:effectRef idx="0">
+            <a:schemeClr val="accent1"/>
+          </a:effectRef>
+          <a:fontRef idx="minor">
+            <a:schemeClr val="lt1"/>
+          </a:fontRef>
+        </p:style>
+        <p:txBody>
+          <a:bodyPr rtlCol="0" anchor="ctr"/>
+          <a:lstStyle/>
+          <a:p>
+            <a:pPr algn="ctr"/>
+            <a:endParaRPr lang="en-US"/>
+          </a:p>
+        </p:txBody>
+      </p:sp>
     </p:spTree>
     <p:extLst>
       <p:ext uri="{BB962C8B-B14F-4D97-AF65-F5344CB8AC3E}">
@@ -22194,9 +22991,575 @@
   <p:timing>
     <p:tnLst>
       <p:par>
-        <p:cTn id="1" dur="indefinite" restart="never" nodeType="tmRoot"/>
+        <p:cTn id="1" dur="indefinite" restart="never" nodeType="tmRoot">
+          <p:childTnLst>
+            <p:seq concurrent="1" nextAc="seek">
+              <p:cTn id="2" dur="indefinite" nodeType="mainSeq">
+                <p:childTnLst>
+                  <p:par>
+                    <p:cTn id="3" fill="hold">
+                      <p:stCondLst>
+                        <p:cond delay="indefinite"/>
+                      </p:stCondLst>
+                      <p:childTnLst>
+                        <p:par>
+                          <p:cTn id="4" fill="hold">
+                            <p:stCondLst>
+                              <p:cond delay="0"/>
+                            </p:stCondLst>
+                            <p:childTnLst>
+                              <p:par>
+                                <p:cTn id="5" presetID="1" presetClass="entr" presetSubtype="0" fill="hold" grpId="0" nodeType="clickEffect">
+                                  <p:stCondLst>
+                                    <p:cond delay="0"/>
+                                  </p:stCondLst>
+                                  <p:childTnLst>
+                                    <p:set>
+                                      <p:cBhvr>
+                                        <p:cTn id="6" dur="1" fill="hold">
+                                          <p:stCondLst>
+                                            <p:cond delay="0"/>
+                                          </p:stCondLst>
+                                        </p:cTn>
+                                        <p:tgtEl>
+                                          <p:spTgt spid="23"/>
+                                        </p:tgtEl>
+                                        <p:attrNameLst>
+                                          <p:attrName>style.visibility</p:attrName>
+                                        </p:attrNameLst>
+                                      </p:cBhvr>
+                                      <p:to>
+                                        <p:strVal val="visible"/>
+                                      </p:to>
+                                    </p:set>
+                                  </p:childTnLst>
+                                </p:cTn>
+                              </p:par>
+                            </p:childTnLst>
+                          </p:cTn>
+                        </p:par>
+                      </p:childTnLst>
+                    </p:cTn>
+                  </p:par>
+                  <p:par>
+                    <p:cTn id="7" fill="hold">
+                      <p:stCondLst>
+                        <p:cond delay="indefinite"/>
+                      </p:stCondLst>
+                      <p:childTnLst>
+                        <p:par>
+                          <p:cTn id="8" fill="hold">
+                            <p:stCondLst>
+                              <p:cond delay="0"/>
+                            </p:stCondLst>
+                            <p:childTnLst>
+                              <p:par>
+                                <p:cTn id="9" presetID="1" presetClass="entr" presetSubtype="0" fill="hold" grpId="0" nodeType="clickEffect">
+                                  <p:stCondLst>
+                                    <p:cond delay="0"/>
+                                  </p:stCondLst>
+                                  <p:childTnLst>
+                                    <p:set>
+                                      <p:cBhvr>
+                                        <p:cTn id="10" dur="1" fill="hold">
+                                          <p:stCondLst>
+                                            <p:cond delay="0"/>
+                                          </p:stCondLst>
+                                        </p:cTn>
+                                        <p:tgtEl>
+                                          <p:spTgt spid="15"/>
+                                        </p:tgtEl>
+                                        <p:attrNameLst>
+                                          <p:attrName>style.visibility</p:attrName>
+                                        </p:attrNameLst>
+                                      </p:cBhvr>
+                                      <p:to>
+                                        <p:strVal val="visible"/>
+                                      </p:to>
+                                    </p:set>
+                                  </p:childTnLst>
+                                </p:cTn>
+                              </p:par>
+                              <p:par>
+                                <p:cTn id="11" presetID="1" presetClass="entr" presetSubtype="0" fill="hold" nodeType="withEffect">
+                                  <p:stCondLst>
+                                    <p:cond delay="0"/>
+                                  </p:stCondLst>
+                                  <p:childTnLst>
+                                    <p:set>
+                                      <p:cBhvr>
+                                        <p:cTn id="12" dur="1" fill="hold">
+                                          <p:stCondLst>
+                                            <p:cond delay="0"/>
+                                          </p:stCondLst>
+                                        </p:cTn>
+                                        <p:tgtEl>
+                                          <p:spTgt spid="3074"/>
+                                        </p:tgtEl>
+                                        <p:attrNameLst>
+                                          <p:attrName>style.visibility</p:attrName>
+                                        </p:attrNameLst>
+                                      </p:cBhvr>
+                                      <p:to>
+                                        <p:strVal val="visible"/>
+                                      </p:to>
+                                    </p:set>
+                                  </p:childTnLst>
+                                </p:cTn>
+                              </p:par>
+                            </p:childTnLst>
+                          </p:cTn>
+                        </p:par>
+                      </p:childTnLst>
+                    </p:cTn>
+                  </p:par>
+                  <p:par>
+                    <p:cTn id="13" fill="hold">
+                      <p:stCondLst>
+                        <p:cond delay="indefinite"/>
+                      </p:stCondLst>
+                      <p:childTnLst>
+                        <p:par>
+                          <p:cTn id="14" fill="hold">
+                            <p:stCondLst>
+                              <p:cond delay="0"/>
+                            </p:stCondLst>
+                            <p:childTnLst>
+                              <p:par>
+                                <p:cTn id="15" presetID="1" presetClass="entr" presetSubtype="0" fill="hold" grpId="0" nodeType="clickEffect">
+                                  <p:stCondLst>
+                                    <p:cond delay="0"/>
+                                  </p:stCondLst>
+                                  <p:childTnLst>
+                                    <p:set>
+                                      <p:cBhvr>
+                                        <p:cTn id="16" dur="1" fill="hold">
+                                          <p:stCondLst>
+                                            <p:cond delay="0"/>
+                                          </p:stCondLst>
+                                        </p:cTn>
+                                        <p:tgtEl>
+                                          <p:spTgt spid="28"/>
+                                        </p:tgtEl>
+                                        <p:attrNameLst>
+                                          <p:attrName>style.visibility</p:attrName>
+                                        </p:attrNameLst>
+                                      </p:cBhvr>
+                                      <p:to>
+                                        <p:strVal val="visible"/>
+                                      </p:to>
+                                    </p:set>
+                                  </p:childTnLst>
+                                </p:cTn>
+                              </p:par>
+                            </p:childTnLst>
+                          </p:cTn>
+                        </p:par>
+                      </p:childTnLst>
+                    </p:cTn>
+                  </p:par>
+                  <p:par>
+                    <p:cTn id="17" fill="hold">
+                      <p:stCondLst>
+                        <p:cond delay="indefinite"/>
+                      </p:stCondLst>
+                      <p:childTnLst>
+                        <p:par>
+                          <p:cTn id="18" fill="hold">
+                            <p:stCondLst>
+                              <p:cond delay="0"/>
+                            </p:stCondLst>
+                            <p:childTnLst>
+                              <p:par>
+                                <p:cTn id="19" presetID="1" presetClass="entr" presetSubtype="0" fill="hold" nodeType="clickEffect">
+                                  <p:stCondLst>
+                                    <p:cond delay="0"/>
+                                  </p:stCondLst>
+                                  <p:childTnLst>
+                                    <p:set>
+                                      <p:cBhvr>
+                                        <p:cTn id="20" dur="1" fill="hold">
+                                          <p:stCondLst>
+                                            <p:cond delay="0"/>
+                                          </p:stCondLst>
+                                        </p:cTn>
+                                        <p:tgtEl>
+                                          <p:spTgt spid="4"/>
+                                        </p:tgtEl>
+                                        <p:attrNameLst>
+                                          <p:attrName>style.visibility</p:attrName>
+                                        </p:attrNameLst>
+                                      </p:cBhvr>
+                                      <p:to>
+                                        <p:strVal val="visible"/>
+                                      </p:to>
+                                    </p:set>
+                                  </p:childTnLst>
+                                </p:cTn>
+                              </p:par>
+                              <p:par>
+                                <p:cTn id="21" presetID="1" presetClass="entr" presetSubtype="0" fill="hold" grpId="0" nodeType="withEffect">
+                                  <p:stCondLst>
+                                    <p:cond delay="0"/>
+                                  </p:stCondLst>
+                                  <p:childTnLst>
+                                    <p:set>
+                                      <p:cBhvr>
+                                        <p:cTn id="22" dur="1" fill="hold">
+                                          <p:stCondLst>
+                                            <p:cond delay="0"/>
+                                          </p:stCondLst>
+                                        </p:cTn>
+                                        <p:tgtEl>
+                                          <p:spTgt spid="5"/>
+                                        </p:tgtEl>
+                                        <p:attrNameLst>
+                                          <p:attrName>style.visibility</p:attrName>
+                                        </p:attrNameLst>
+                                      </p:cBhvr>
+                                      <p:to>
+                                        <p:strVal val="visible"/>
+                                      </p:to>
+                                    </p:set>
+                                  </p:childTnLst>
+                                </p:cTn>
+                              </p:par>
+                              <p:par>
+                                <p:cTn id="23" presetID="1" presetClass="entr" presetSubtype="0" fill="hold" grpId="0" nodeType="withEffect">
+                                  <p:stCondLst>
+                                    <p:cond delay="0"/>
+                                  </p:stCondLst>
+                                  <p:childTnLst>
+                                    <p:set>
+                                      <p:cBhvr>
+                                        <p:cTn id="24" dur="1" fill="hold">
+                                          <p:stCondLst>
+                                            <p:cond delay="0"/>
+                                          </p:stCondLst>
+                                        </p:cTn>
+                                        <p:tgtEl>
+                                          <p:spTgt spid="16"/>
+                                        </p:tgtEl>
+                                        <p:attrNameLst>
+                                          <p:attrName>style.visibility</p:attrName>
+                                        </p:attrNameLst>
+                                      </p:cBhvr>
+                                      <p:to>
+                                        <p:strVal val="visible"/>
+                                      </p:to>
+                                    </p:set>
+                                  </p:childTnLst>
+                                </p:cTn>
+                              </p:par>
+                              <p:par>
+                                <p:cTn id="25" presetID="1" presetClass="entr" presetSubtype="0" fill="hold" grpId="0" nodeType="withEffect">
+                                  <p:stCondLst>
+                                    <p:cond delay="0"/>
+                                  </p:stCondLst>
+                                  <p:childTnLst>
+                                    <p:set>
+                                      <p:cBhvr>
+                                        <p:cTn id="26" dur="1" fill="hold">
+                                          <p:stCondLst>
+                                            <p:cond delay="0"/>
+                                          </p:stCondLst>
+                                        </p:cTn>
+                                        <p:tgtEl>
+                                          <p:spTgt spid="19"/>
+                                        </p:tgtEl>
+                                        <p:attrNameLst>
+                                          <p:attrName>style.visibility</p:attrName>
+                                        </p:attrNameLst>
+                                      </p:cBhvr>
+                                      <p:to>
+                                        <p:strVal val="visible"/>
+                                      </p:to>
+                                    </p:set>
+                                  </p:childTnLst>
+                                </p:cTn>
+                              </p:par>
+                            </p:childTnLst>
+                          </p:cTn>
+                        </p:par>
+                      </p:childTnLst>
+                    </p:cTn>
+                  </p:par>
+                  <p:par>
+                    <p:cTn id="27" fill="hold">
+                      <p:stCondLst>
+                        <p:cond delay="indefinite"/>
+                      </p:stCondLst>
+                      <p:childTnLst>
+                        <p:par>
+                          <p:cTn id="28" fill="hold">
+                            <p:stCondLst>
+                              <p:cond delay="0"/>
+                            </p:stCondLst>
+                            <p:childTnLst>
+                              <p:par>
+                                <p:cTn id="29" presetID="1" presetClass="entr" presetSubtype="0" fill="hold" grpId="0" nodeType="clickEffect">
+                                  <p:stCondLst>
+                                    <p:cond delay="0"/>
+                                  </p:stCondLst>
+                                  <p:childTnLst>
+                                    <p:set>
+                                      <p:cBhvr>
+                                        <p:cTn id="30" dur="1" fill="hold">
+                                          <p:stCondLst>
+                                            <p:cond delay="0"/>
+                                          </p:stCondLst>
+                                        </p:cTn>
+                                        <p:tgtEl>
+                                          <p:spTgt spid="29"/>
+                                        </p:tgtEl>
+                                        <p:attrNameLst>
+                                          <p:attrName>style.visibility</p:attrName>
+                                        </p:attrNameLst>
+                                      </p:cBhvr>
+                                      <p:to>
+                                        <p:strVal val="visible"/>
+                                      </p:to>
+                                    </p:set>
+                                  </p:childTnLst>
+                                </p:cTn>
+                              </p:par>
+                            </p:childTnLst>
+                          </p:cTn>
+                        </p:par>
+                      </p:childTnLst>
+                    </p:cTn>
+                  </p:par>
+                  <p:par>
+                    <p:cTn id="31" fill="hold">
+                      <p:stCondLst>
+                        <p:cond delay="indefinite"/>
+                      </p:stCondLst>
+                      <p:childTnLst>
+                        <p:par>
+                          <p:cTn id="32" fill="hold">
+                            <p:stCondLst>
+                              <p:cond delay="0"/>
+                            </p:stCondLst>
+                            <p:childTnLst>
+                              <p:par>
+                                <p:cTn id="33" presetID="1" presetClass="entr" presetSubtype="0" fill="hold" grpId="0" nodeType="clickEffect">
+                                  <p:stCondLst>
+                                    <p:cond delay="0"/>
+                                  </p:stCondLst>
+                                  <p:childTnLst>
+                                    <p:set>
+                                      <p:cBhvr>
+                                        <p:cTn id="34" dur="1" fill="hold">
+                                          <p:stCondLst>
+                                            <p:cond delay="0"/>
+                                          </p:stCondLst>
+                                        </p:cTn>
+                                        <p:tgtEl>
+                                          <p:spTgt spid="17"/>
+                                        </p:tgtEl>
+                                        <p:attrNameLst>
+                                          <p:attrName>style.visibility</p:attrName>
+                                        </p:attrNameLst>
+                                      </p:cBhvr>
+                                      <p:to>
+                                        <p:strVal val="visible"/>
+                                      </p:to>
+                                    </p:set>
+                                  </p:childTnLst>
+                                </p:cTn>
+                              </p:par>
+                              <p:par>
+                                <p:cTn id="35" presetID="1" presetClass="entr" presetSubtype="0" fill="hold" nodeType="withEffect">
+                                  <p:stCondLst>
+                                    <p:cond delay="0"/>
+                                  </p:stCondLst>
+                                  <p:childTnLst>
+                                    <p:set>
+                                      <p:cBhvr>
+                                        <p:cTn id="36" dur="1" fill="hold">
+                                          <p:stCondLst>
+                                            <p:cond delay="0"/>
+                                          </p:stCondLst>
+                                        </p:cTn>
+                                        <p:tgtEl>
+                                          <p:spTgt spid="1027"/>
+                                        </p:tgtEl>
+                                        <p:attrNameLst>
+                                          <p:attrName>style.visibility</p:attrName>
+                                        </p:attrNameLst>
+                                      </p:cBhvr>
+                                      <p:to>
+                                        <p:strVal val="visible"/>
+                                      </p:to>
+                                    </p:set>
+                                  </p:childTnLst>
+                                </p:cTn>
+                              </p:par>
+                              <p:par>
+                                <p:cTn id="37" presetID="1" presetClass="entr" presetSubtype="0" fill="hold" grpId="0" nodeType="withEffect">
+                                  <p:stCondLst>
+                                    <p:cond delay="0"/>
+                                  </p:stCondLst>
+                                  <p:childTnLst>
+                                    <p:set>
+                                      <p:cBhvr>
+                                        <p:cTn id="38" dur="1" fill="hold">
+                                          <p:stCondLst>
+                                            <p:cond delay="0"/>
+                                          </p:stCondLst>
+                                        </p:cTn>
+                                        <p:tgtEl>
+                                          <p:spTgt spid="22"/>
+                                        </p:tgtEl>
+                                        <p:attrNameLst>
+                                          <p:attrName>style.visibility</p:attrName>
+                                        </p:attrNameLst>
+                                      </p:cBhvr>
+                                      <p:to>
+                                        <p:strVal val="visible"/>
+                                      </p:to>
+                                    </p:set>
+                                  </p:childTnLst>
+                                </p:cTn>
+                              </p:par>
+                            </p:childTnLst>
+                          </p:cTn>
+                        </p:par>
+                      </p:childTnLst>
+                    </p:cTn>
+                  </p:par>
+                  <p:par>
+                    <p:cTn id="39" fill="hold">
+                      <p:stCondLst>
+                        <p:cond delay="indefinite"/>
+                      </p:stCondLst>
+                      <p:childTnLst>
+                        <p:par>
+                          <p:cTn id="40" fill="hold">
+                            <p:stCondLst>
+                              <p:cond delay="0"/>
+                            </p:stCondLst>
+                            <p:childTnLst>
+                              <p:par>
+                                <p:cTn id="41" presetID="1" presetClass="entr" presetSubtype="0" fill="hold" nodeType="clickEffect">
+                                  <p:stCondLst>
+                                    <p:cond delay="0"/>
+                                  </p:stCondLst>
+                                  <p:childTnLst>
+                                    <p:set>
+                                      <p:cBhvr>
+                                        <p:cTn id="42" dur="1" fill="hold">
+                                          <p:stCondLst>
+                                            <p:cond delay="0"/>
+                                          </p:stCondLst>
+                                        </p:cTn>
+                                        <p:tgtEl>
+                                          <p:spTgt spid="21"/>
+                                        </p:tgtEl>
+                                        <p:attrNameLst>
+                                          <p:attrName>style.visibility</p:attrName>
+                                        </p:attrNameLst>
+                                      </p:cBhvr>
+                                      <p:to>
+                                        <p:strVal val="visible"/>
+                                      </p:to>
+                                    </p:set>
+                                  </p:childTnLst>
+                                </p:cTn>
+                              </p:par>
+                              <p:par>
+                                <p:cTn id="43" presetID="1" presetClass="entr" presetSubtype="0" fill="hold" grpId="0" nodeType="withEffect">
+                                  <p:stCondLst>
+                                    <p:cond delay="0"/>
+                                  </p:stCondLst>
+                                  <p:childTnLst>
+                                    <p:set>
+                                      <p:cBhvr>
+                                        <p:cTn id="44" dur="1" fill="hold">
+                                          <p:stCondLst>
+                                            <p:cond delay="0"/>
+                                          </p:stCondLst>
+                                        </p:cTn>
+                                        <p:tgtEl>
+                                          <p:spTgt spid="18"/>
+                                        </p:tgtEl>
+                                        <p:attrNameLst>
+                                          <p:attrName>style.visibility</p:attrName>
+                                        </p:attrNameLst>
+                                      </p:cBhvr>
+                                      <p:to>
+                                        <p:strVal val="visible"/>
+                                      </p:to>
+                                    </p:set>
+                                  </p:childTnLst>
+                                </p:cTn>
+                              </p:par>
+                              <p:par>
+                                <p:cTn id="45" presetID="1" presetClass="entr" presetSubtype="0" fill="hold" nodeType="withEffect">
+                                  <p:stCondLst>
+                                    <p:cond delay="0"/>
+                                  </p:stCondLst>
+                                  <p:childTnLst>
+                                    <p:set>
+                                      <p:cBhvr>
+                                        <p:cTn id="46" dur="1" fill="hold">
+                                          <p:stCondLst>
+                                            <p:cond delay="0"/>
+                                          </p:stCondLst>
+                                        </p:cTn>
+                                        <p:tgtEl>
+                                          <p:spTgt spid="1028"/>
+                                        </p:tgtEl>
+                                        <p:attrNameLst>
+                                          <p:attrName>style.visibility</p:attrName>
+                                        </p:attrNameLst>
+                                      </p:cBhvr>
+                                      <p:to>
+                                        <p:strVal val="visible"/>
+                                      </p:to>
+                                    </p:set>
+                                  </p:childTnLst>
+                                </p:cTn>
+                              </p:par>
+                            </p:childTnLst>
+                          </p:cTn>
+                        </p:par>
+                      </p:childTnLst>
+                    </p:cTn>
+                  </p:par>
+                </p:childTnLst>
+              </p:cTn>
+              <p:prevCondLst>
+                <p:cond evt="onPrev" delay="0">
+                  <p:tgtEl>
+                    <p:sldTgt/>
+                  </p:tgtEl>
+                </p:cond>
+              </p:prevCondLst>
+              <p:nextCondLst>
+                <p:cond evt="onNext" delay="0">
+                  <p:tgtEl>
+                    <p:sldTgt/>
+                  </p:tgtEl>
+                </p:cond>
+              </p:nextCondLst>
+            </p:seq>
+          </p:childTnLst>
+        </p:cTn>
       </p:par>
     </p:tnLst>
+    <p:bldLst>
+      <p:bldP spid="29" grpId="0" animBg="1"/>
+      <p:bldP spid="5" grpId="0" animBg="1"/>
+      <p:bldP spid="15" grpId="0" animBg="1"/>
+      <p:bldP spid="16" grpId="0"/>
+      <p:bldP spid="19" grpId="0" animBg="1"/>
+      <p:bldP spid="17" grpId="0" animBg="1"/>
+      <p:bldP spid="22" grpId="0" animBg="1"/>
+      <p:bldP spid="18" grpId="0" animBg="1"/>
+      <p:bldP spid="23" grpId="0" animBg="1"/>
+      <p:bldP spid="28" grpId="0" animBg="1"/>
+    </p:bldLst>
   </p:timing>
 </p:sld>
 </file>
@@ -22296,7 +23659,7 @@
                 <a:ea typeface="Lato" panose="020F0502020204030203" pitchFamily="34" charset="0"/>
                 <a:cs typeface="Lato" panose="020F0502020204030203" pitchFamily="34" charset="0"/>
               </a:rPr>
-              <a:t>July 4, 2017</a:t>
+              <a:t>July 5, 2017</a:t>
             </a:fld>
             <a:endParaRPr lang="en-US" dirty="0">
               <a:solidFill>
@@ -22777,16 +24140,6 @@
               </a:rPr>
               <a:t>Conclusion</a:t>
             </a:r>
-            <a:endParaRPr lang="en-GB" sz="2000" dirty="0">
-              <a:solidFill>
-                <a:schemeClr val="bg1">
-                  <a:lumMod val="75000"/>
-                </a:schemeClr>
-              </a:solidFill>
-              <a:latin typeface="Lato" panose="020F0502020204030203" pitchFamily="34" charset="0"/>
-              <a:ea typeface="Lato" panose="020F0502020204030203" pitchFamily="34" charset="0"/>
-              <a:cs typeface="Lato" panose="020F0502020204030203" pitchFamily="34" charset="0"/>
-            </a:endParaRPr>
           </a:p>
         </p:txBody>
       </p:sp>
@@ -22905,7 +24258,7 @@
                 <a:ea typeface="Lato" panose="020F0502020204030203" pitchFamily="34" charset="0"/>
                 <a:cs typeface="Lato" panose="020F0502020204030203" pitchFamily="34" charset="0"/>
               </a:rPr>
-              <a:t>July 4, 2017</a:t>
+              <a:t>July 5, 2017</a:t>
             </a:fld>
             <a:endParaRPr lang="en-US" dirty="0">
               <a:solidFill>
@@ -23182,7 +24535,7 @@
         <p:spPr>
           <a:xfrm>
             <a:off x="395536" y="1231131"/>
-            <a:ext cx="8496943" cy="3416320"/>
+            <a:ext cx="8496943" cy="5078313"/>
           </a:xfrm>
           <a:prstGeom prst="rect">
             <a:avLst/>
@@ -23201,8 +24554,10 @@
                 <a:ea typeface="Lato" panose="020F0502020204030203" pitchFamily="34" charset="0"/>
                 <a:cs typeface="Lato" panose="020F0502020204030203" pitchFamily="34" charset="0"/>
               </a:rPr>
-              <a:t>Limitations of the tool  for frequency domain requirements</a:t>
-            </a:r>
+              <a:t>Challenges of frequency domain property monitoring</a:t>
+            </a:r>
+          </a:p>
+          <a:p>
             <a:endParaRPr lang="en-GB" dirty="0" smtClean="0">
               <a:latin typeface="Lato" panose="020F0502020204030203" pitchFamily="34" charset="0"/>
               <a:ea typeface="Lato" panose="020F0502020204030203" pitchFamily="34" charset="0"/>
@@ -23210,6 +24565,24 @@
             </a:endParaRPr>
           </a:p>
           <a:p>
+            <a:pPr marL="285750" indent="-285750">
+              <a:buFont typeface="Arial" panose="020B0604020202020204" pitchFamily="34" charset="0"/>
+              <a:buChar char="•"/>
+            </a:pPr>
+            <a:r>
+              <a:rPr lang="en-GB" dirty="0">
+                <a:latin typeface="Lato" panose="020F0502020204030203" pitchFamily="34" charset="0"/>
+                <a:ea typeface="Lato" panose="020F0502020204030203" pitchFamily="34" charset="0"/>
+                <a:cs typeface="Lato" panose="020F0502020204030203" pitchFamily="34" charset="0"/>
+              </a:rPr>
+              <a:t>Fourier Transform</a:t>
+            </a:r>
+          </a:p>
+          <a:p>
+            <a:pPr marL="285750" indent="-285750">
+              <a:buFont typeface="Arial" panose="020B0604020202020204" pitchFamily="34" charset="0"/>
+              <a:buChar char="•"/>
+            </a:pPr>
             <a:endParaRPr lang="en-GB" dirty="0" smtClean="0">
               <a:latin typeface="Lato" panose="020F0502020204030203" pitchFamily="34" charset="0"/>
               <a:ea typeface="Lato" panose="020F0502020204030203" pitchFamily="34" charset="0"/>
@@ -23217,40 +24590,45 @@
             </a:endParaRPr>
           </a:p>
           <a:p>
+            <a:pPr marL="285750" indent="-285750">
+              <a:buFont typeface="Arial" panose="020B0604020202020204" pitchFamily="34" charset="0"/>
+              <a:buChar char="•"/>
+            </a:pPr>
             <a:r>
               <a:rPr lang="en-GB" dirty="0" smtClean="0">
                 <a:latin typeface="Lato" panose="020F0502020204030203" pitchFamily="34" charset="0"/>
                 <a:ea typeface="Lato" panose="020F0502020204030203" pitchFamily="34" charset="0"/>
                 <a:cs typeface="Lato" panose="020F0502020204030203" pitchFamily="34" charset="0"/>
               </a:rPr>
-              <a:t>Reason why:</a:t>
-            </a:r>
-          </a:p>
-          <a:p>
-            <a:r>
-              <a:rPr lang="en-GB" dirty="0">
-                <a:latin typeface="Lato" panose="020F0502020204030203" pitchFamily="34" charset="0"/>
-                <a:ea typeface="Lato" panose="020F0502020204030203" pitchFamily="34" charset="0"/>
-                <a:cs typeface="Lato" panose="020F0502020204030203" pitchFamily="34" charset="0"/>
-              </a:rPr>
-              <a:t>In this work frequency monitors have been programmed manually in </a:t>
-            </a:r>
-            <a:r>
-              <a:rPr lang="en-GB" dirty="0" err="1">
-                <a:latin typeface="Lato" panose="020F0502020204030203" pitchFamily="34" charset="0"/>
-                <a:ea typeface="Lato" panose="020F0502020204030203" pitchFamily="34" charset="0"/>
-                <a:cs typeface="Lato" panose="020F0502020204030203" pitchFamily="34" charset="0"/>
-              </a:rPr>
-              <a:t>simulink</a:t>
-            </a:r>
+              <a:t>System Identification</a:t>
+            </a:r>
+          </a:p>
+          <a:p>
+            <a:endParaRPr lang="en-GB" dirty="0" smtClean="0">
+              <a:latin typeface="Lato" panose="020F0502020204030203" pitchFamily="34" charset="0"/>
+              <a:ea typeface="Lato" panose="020F0502020204030203" pitchFamily="34" charset="0"/>
+              <a:cs typeface="Lato" panose="020F0502020204030203" pitchFamily="34" charset="0"/>
+            </a:endParaRPr>
+          </a:p>
+          <a:p>
+            <a:pPr marL="285750" indent="-285750">
+              <a:buFont typeface="Arial" panose="020B0604020202020204" pitchFamily="34" charset="0"/>
+              <a:buChar char="•"/>
+            </a:pPr>
             <a:r>
               <a:rPr lang="en-GB" dirty="0" smtClean="0">
                 <a:latin typeface="Lato" panose="020F0502020204030203" pitchFamily="34" charset="0"/>
                 <a:ea typeface="Lato" panose="020F0502020204030203" pitchFamily="34" charset="0"/>
                 <a:cs typeface="Lato" panose="020F0502020204030203" pitchFamily="34" charset="0"/>
               </a:rPr>
-              <a:t>,</a:t>
-            </a:r>
+              <a:t>Explore the frequency spectrum</a:t>
+            </a:r>
+          </a:p>
+          <a:p>
+            <a:pPr marL="285750" indent="-285750">
+              <a:buFont typeface="Arial" panose="020B0604020202020204" pitchFamily="34" charset="0"/>
+              <a:buChar char="•"/>
+            </a:pPr>
             <a:endParaRPr lang="en-GB" dirty="0">
               <a:latin typeface="Lato" panose="020F0502020204030203" pitchFamily="34" charset="0"/>
               <a:ea typeface="Lato" panose="020F0502020204030203" pitchFamily="34" charset="0"/>
@@ -23258,6 +24636,69 @@
             </a:endParaRPr>
           </a:p>
           <a:p>
+            <a:pPr marL="285750" indent="-285750">
+              <a:buFont typeface="Arial" panose="020B0604020202020204" pitchFamily="34" charset="0"/>
+              <a:buChar char="•"/>
+            </a:pPr>
+            <a:r>
+              <a:rPr lang="en-GB" dirty="0" smtClean="0">
+                <a:latin typeface="Lato" panose="020F0502020204030203" pitchFamily="34" charset="0"/>
+                <a:ea typeface="Lato" panose="020F0502020204030203" pitchFamily="34" charset="0"/>
+                <a:cs typeface="Lato" panose="020F0502020204030203" pitchFamily="34" charset="0"/>
+              </a:rPr>
+              <a:t>Results strongly affected from configurations</a:t>
+            </a:r>
+          </a:p>
+          <a:p>
+            <a:endParaRPr lang="en-GB" dirty="0">
+              <a:latin typeface="Lato" panose="020F0502020204030203" pitchFamily="34" charset="0"/>
+              <a:ea typeface="Lato" panose="020F0502020204030203" pitchFamily="34" charset="0"/>
+              <a:cs typeface="Lato" panose="020F0502020204030203" pitchFamily="34" charset="0"/>
+            </a:endParaRPr>
+          </a:p>
+          <a:p>
+            <a:r>
+              <a:rPr lang="en-GB" dirty="0" smtClean="0">
+                <a:latin typeface="Lato" panose="020F0502020204030203" pitchFamily="34" charset="0"/>
+                <a:ea typeface="Lato" panose="020F0502020204030203" pitchFamily="34" charset="0"/>
+                <a:cs typeface="Lato" panose="020F0502020204030203" pitchFamily="34" charset="0"/>
+              </a:rPr>
+              <a:t>Automatic Generation is </a:t>
+            </a:r>
+            <a:r>
+              <a:rPr lang="en-GB" dirty="0">
+                <a:latin typeface="Lato" panose="020F0502020204030203" pitchFamily="34" charset="0"/>
+                <a:ea typeface="Lato" panose="020F0502020204030203" pitchFamily="34" charset="0"/>
+                <a:cs typeface="Lato" panose="020F0502020204030203" pitchFamily="34" charset="0"/>
+              </a:rPr>
+              <a:t>powerful </a:t>
+            </a:r>
+            <a:r>
+              <a:rPr lang="en-GB" dirty="0" smtClean="0">
+                <a:latin typeface="Lato" panose="020F0502020204030203" pitchFamily="34" charset="0"/>
+                <a:ea typeface="Lato" panose="020F0502020204030203" pitchFamily="34" charset="0"/>
+                <a:cs typeface="Lato" panose="020F0502020204030203" pitchFamily="34" charset="0"/>
+              </a:rPr>
+              <a:t>but, unfortunately, </a:t>
+            </a:r>
+            <a:r>
+              <a:rPr lang="en-GB" dirty="0">
+                <a:latin typeface="Lato" panose="020F0502020204030203" pitchFamily="34" charset="0"/>
+                <a:ea typeface="Lato" panose="020F0502020204030203" pitchFamily="34" charset="0"/>
+                <a:cs typeface="Lato" panose="020F0502020204030203" pitchFamily="34" charset="0"/>
+              </a:rPr>
+              <a:t>not </a:t>
+            </a:r>
+            <a:r>
+              <a:rPr lang="en-GB" i="1" dirty="0" smtClean="0">
+                <a:latin typeface="Lato" panose="020F0502020204030203" pitchFamily="34" charset="0"/>
+                <a:ea typeface="Lato" panose="020F0502020204030203" pitchFamily="34" charset="0"/>
+                <a:cs typeface="Lato" panose="020F0502020204030203" pitchFamily="34" charset="0"/>
+              </a:rPr>
+              <a:t>invincible…</a:t>
+            </a:r>
+          </a:p>
+          <a:p>
             <a:endParaRPr lang="en-GB" dirty="0" smtClean="0">
               <a:latin typeface="Lato" panose="020F0502020204030203" pitchFamily="34" charset="0"/>
               <a:ea typeface="Lato" panose="020F0502020204030203" pitchFamily="34" charset="0"/>
@@ -23271,43 +24712,61 @@
                 <a:ea typeface="Lato" panose="020F0502020204030203" pitchFamily="34" charset="0"/>
                 <a:cs typeface="Lato" panose="020F0502020204030203" pitchFamily="34" charset="0"/>
               </a:rPr>
-              <a:t>Objectives:</a:t>
-            </a:r>
-          </a:p>
-          <a:p>
+              <a:t>Objectives</a:t>
+            </a:r>
+          </a:p>
+          <a:p>
+            <a:endParaRPr lang="en-GB" dirty="0">
+              <a:latin typeface="Lato" panose="020F0502020204030203" pitchFamily="34" charset="0"/>
+              <a:ea typeface="Lato" panose="020F0502020204030203" pitchFamily="34" charset="0"/>
+              <a:cs typeface="Lato" panose="020F0502020204030203" pitchFamily="34" charset="0"/>
+            </a:endParaRPr>
+          </a:p>
+          <a:p>
+            <a:pPr marL="285750" indent="-285750">
+              <a:buFont typeface="Arial" panose="020B0604020202020204" pitchFamily="34" charset="0"/>
+              <a:buChar char="•"/>
+            </a:pPr>
             <a:r>
               <a:rPr lang="en-GB" dirty="0" smtClean="0">
                 <a:latin typeface="Lato" panose="020F0502020204030203" pitchFamily="34" charset="0"/>
                 <a:ea typeface="Lato" panose="020F0502020204030203" pitchFamily="34" charset="0"/>
                 <a:cs typeface="Lato" panose="020F0502020204030203" pitchFamily="34" charset="0"/>
               </a:rPr>
-              <a:t>Optimize the existing procedure (provide online feedbacks)</a:t>
-            </a:r>
-          </a:p>
-          <a:p>
+              <a:t>Online Monitoring</a:t>
+            </a:r>
+          </a:p>
+          <a:p>
+            <a:pPr marL="285750" indent="-285750">
+              <a:buFont typeface="Arial" panose="020B0604020202020204" pitchFamily="34" charset="0"/>
+              <a:buChar char="•"/>
+            </a:pPr>
+            <a:endParaRPr lang="en-GB" dirty="0">
+              <a:latin typeface="Lato" panose="020F0502020204030203" pitchFamily="34" charset="0"/>
+              <a:ea typeface="Lato" panose="020F0502020204030203" pitchFamily="34" charset="0"/>
+              <a:cs typeface="Lato" panose="020F0502020204030203" pitchFamily="34" charset="0"/>
+            </a:endParaRPr>
+          </a:p>
+          <a:p>
+            <a:pPr marL="285750" indent="-285750">
+              <a:buFont typeface="Arial" panose="020B0604020202020204" pitchFamily="34" charset="0"/>
+              <a:buChar char="•"/>
+            </a:pPr>
             <a:r>
               <a:rPr lang="en-GB" dirty="0" smtClean="0">
                 <a:latin typeface="Lato" panose="020F0502020204030203" pitchFamily="34" charset="0"/>
                 <a:ea typeface="Lato" panose="020F0502020204030203" pitchFamily="34" charset="0"/>
                 <a:cs typeface="Lato" panose="020F0502020204030203" pitchFamily="34" charset="0"/>
               </a:rPr>
-              <a:t>Try to formalize with STL the suitable subset of the frequency response monitor to address </a:t>
-            </a:r>
-            <a:r>
-              <a:rPr lang="en-GB" dirty="0" smtClean="0">
-                <a:latin typeface="Lato" panose="020F0502020204030203" pitchFamily="34" charset="0"/>
-                <a:ea typeface="Lato" panose="020F0502020204030203" pitchFamily="34" charset="0"/>
-                <a:cs typeface="Lato" panose="020F0502020204030203" pitchFamily="34" charset="0"/>
-              </a:rPr>
-              <a:t>gain margin and phase margin and bandwidth are satisfying </a:t>
-            </a:r>
-            <a:r>
-              <a:rPr lang="en-GB" dirty="0">
-                <a:latin typeface="Lato" panose="020F0502020204030203" pitchFamily="34" charset="0"/>
-                <a:ea typeface="Lato" panose="020F0502020204030203" pitchFamily="34" charset="0"/>
-                <a:cs typeface="Lato" panose="020F0502020204030203" pitchFamily="34" charset="0"/>
-              </a:rPr>
-              <a:t>certain thresholds and  relative stability of the system </a:t>
+              <a:t>Involve, whenever possible, </a:t>
+            </a:r>
+            <a:r>
+              <a:rPr lang="en-GB" smtClean="0">
+                <a:latin typeface="Lato" panose="020F0502020204030203" pitchFamily="34" charset="0"/>
+                <a:ea typeface="Lato" panose="020F0502020204030203" pitchFamily="34" charset="0"/>
+                <a:cs typeface="Lato" panose="020F0502020204030203" pitchFamily="34" charset="0"/>
+              </a:rPr>
+              <a:t>formal logic</a:t>
             </a:r>
             <a:endParaRPr lang="en-GB" dirty="0" smtClean="0">
               <a:latin typeface="Lato" panose="020F0502020204030203" pitchFamily="34" charset="0"/>
@@ -23322,19 +24781,12 @@
               <a:cs typeface="Lato" panose="020F0502020204030203" pitchFamily="34" charset="0"/>
             </a:endParaRPr>
           </a:p>
-          <a:p>
-            <a:endParaRPr lang="en-GB" dirty="0">
-              <a:latin typeface="Lato" panose="020F0502020204030203" pitchFamily="34" charset="0"/>
-              <a:ea typeface="Lato" panose="020F0502020204030203" pitchFamily="34" charset="0"/>
-              <a:cs typeface="Lato" panose="020F0502020204030203" pitchFamily="34" charset="0"/>
-            </a:endParaRPr>
-          </a:p>
         </p:txBody>
       </p:sp>
     </p:spTree>
     <p:extLst>
       <p:ext uri="{BB962C8B-B14F-4D97-AF65-F5344CB8AC3E}">
-        <p14:creationId xmlns:p14="http://schemas.microsoft.com/office/powerpoint/2010/main" val="3776495420"/>
+        <p14:creationId xmlns:p14="http://schemas.microsoft.com/office/powerpoint/2010/main" val="1518668937"/>
       </p:ext>
     </p:extLst>
   </p:cSld>
@@ -23446,7 +24898,7 @@
                 <a:ea typeface="Lato" panose="020F0502020204030203" pitchFamily="34" charset="0"/>
                 <a:cs typeface="Lato" panose="020F0502020204030203" pitchFamily="34" charset="0"/>
               </a:rPr>
-              <a:t>July 4, 2017</a:t>
+              <a:t>July 5, 2017</a:t>
             </a:fld>
             <a:endParaRPr lang="en-US" dirty="0">
               <a:solidFill>
@@ -23551,8 +25003,8 @@
         </p:nvSpPr>
         <p:spPr>
           <a:xfrm>
-            <a:off x="395535" y="240837"/>
-            <a:ext cx="2398099" cy="461665"/>
+            <a:off x="395537" y="545134"/>
+            <a:ext cx="2880319" cy="461665"/>
           </a:xfrm>
           <a:prstGeom prst="rect">
             <a:avLst/>
@@ -23566,12 +25018,20 @@
           <a:lstStyle/>
           <a:p>
             <a:r>
+              <a:rPr lang="en-GB" sz="2400" b="1" i="1" dirty="0" smtClean="0">
+                <a:latin typeface="Lato Medium" panose="020F0502020204030203" pitchFamily="34" charset="0"/>
+                <a:ea typeface="Lato Medium" panose="020F0502020204030203" pitchFamily="34" charset="0"/>
+                <a:cs typeface="Lato Medium" panose="020F0502020204030203" pitchFamily="34" charset="0"/>
+              </a:rPr>
+              <a:t>FResp</a:t>
+            </a:r>
+            <a:r>
               <a:rPr lang="en-GB" sz="2400" b="1" dirty="0" smtClean="0">
                 <a:latin typeface="Lato Medium" panose="020F0502020204030203" pitchFamily="34" charset="0"/>
                 <a:ea typeface="Lato Medium" panose="020F0502020204030203" pitchFamily="34" charset="0"/>
                 <a:cs typeface="Lato Medium" panose="020F0502020204030203" pitchFamily="34" charset="0"/>
               </a:rPr>
-              <a:t>Outline</a:t>
+              <a:t> Monitor (tips)</a:t>
             </a:r>
             <a:endParaRPr lang="en-US" sz="2400" b="1" dirty="0">
               <a:latin typeface="Lato Medium" panose="020F0502020204030203" pitchFamily="34" charset="0"/>
@@ -23627,8 +25087,8 @@
         </p:nvSpPr>
         <p:spPr>
           <a:xfrm>
-            <a:off x="395535" y="748439"/>
-            <a:ext cx="2398099" cy="45719"/>
+            <a:off x="395537" y="1052736"/>
+            <a:ext cx="2808311" cy="45719"/>
           </a:xfrm>
           <a:prstGeom prst="rect">
             <a:avLst/>
@@ -23670,14 +25130,14 @@
       </p:sp>
       <p:sp>
         <p:nvSpPr>
-          <p:cNvPr id="13" name="TextBox 12"/>
+          <p:cNvPr id="4" name="TextBox 3"/>
           <p:cNvSpPr txBox="1"/>
           <p:nvPr/>
         </p:nvSpPr>
         <p:spPr>
           <a:xfrm>
-            <a:off x="405288" y="1052736"/>
-            <a:ext cx="8496943" cy="4708981"/>
+            <a:off x="395536" y="237357"/>
+            <a:ext cx="2398100" cy="307777"/>
           </a:xfrm>
           <a:prstGeom prst="rect">
             <a:avLst/>
@@ -23690,260 +25150,229 @@
           </a:bodyPr>
           <a:lstStyle/>
           <a:p>
-            <a:pPr marL="457200" indent="-457200">
-              <a:buFont typeface="+mj-lt"/>
-              <a:buAutoNum type="arabicPeriod"/>
-            </a:pPr>
-            <a:r>
-              <a:rPr lang="en-GB" sz="2000" dirty="0">
-                <a:solidFill>
-                  <a:schemeClr val="bg1">
-                    <a:lumMod val="75000"/>
-                  </a:schemeClr>
-                </a:solidFill>
-                <a:latin typeface="Lato" panose="020F0502020204030203" pitchFamily="34" charset="0"/>
-                <a:ea typeface="Lato" panose="020F0502020204030203" pitchFamily="34" charset="0"/>
-                <a:cs typeface="Lato" panose="020F0502020204030203" pitchFamily="34" charset="0"/>
-              </a:rPr>
-              <a:t>Introduction</a:t>
-            </a:r>
-          </a:p>
-          <a:p>
-            <a:pPr marL="457200" indent="-457200">
-              <a:buFont typeface="+mj-lt"/>
-              <a:buAutoNum type="arabicPeriod"/>
-            </a:pPr>
-            <a:endParaRPr lang="en-GB" sz="2000" dirty="0">
+            <a:r>
+              <a:rPr lang="en-GB" sz="1400" dirty="0" smtClean="0">
+                <a:latin typeface="Lato" panose="020F0502020204030203" pitchFamily="34" charset="0"/>
+                <a:ea typeface="Lato" panose="020F0502020204030203" pitchFamily="34" charset="0"/>
+                <a:cs typeface="Lato" panose="020F0502020204030203" pitchFamily="34" charset="0"/>
+              </a:rPr>
+              <a:t>Frequency Response</a:t>
+            </a:r>
+            <a:endParaRPr lang="en-US" dirty="0">
               <a:latin typeface="Lato" panose="020F0502020204030203" pitchFamily="34" charset="0"/>
               <a:ea typeface="Lato" panose="020F0502020204030203" pitchFamily="34" charset="0"/>
               <a:cs typeface="Lato" panose="020F0502020204030203" pitchFamily="34" charset="0"/>
             </a:endParaRPr>
           </a:p>
-          <a:p>
-            <a:pPr marL="457200" indent="-457200">
-              <a:buFont typeface="+mj-lt"/>
-              <a:buAutoNum type="arabicPeriod"/>
+        </p:txBody>
+      </p:sp>
+      <p:sp>
+        <p:nvSpPr>
+          <p:cNvPr id="13" name="TextBox 12"/>
+          <p:cNvSpPr txBox="1"/>
+          <p:nvPr/>
+        </p:nvSpPr>
+        <p:spPr>
+          <a:xfrm>
+            <a:off x="395536" y="1231131"/>
+            <a:ext cx="8496943" cy="3416320"/>
+          </a:xfrm>
+          <a:prstGeom prst="rect">
+            <a:avLst/>
+          </a:prstGeom>
+          <a:noFill/>
+        </p:spPr>
+        <p:txBody>
+          <a:bodyPr wrap="square" rtlCol="0">
+            <a:spAutoFit/>
+          </a:bodyPr>
+          <a:lstStyle/>
+          <a:p>
+            <a:pPr marL="285750" indent="-285750">
+              <a:buFont typeface="Arial" panose="020B0604020202020204" pitchFamily="34" charset="0"/>
+              <a:buChar char="•"/>
             </a:pPr>
             <a:r>
-              <a:rPr lang="en-GB" sz="2000" dirty="0">
-                <a:solidFill>
-                  <a:schemeClr val="bg1">
-                    <a:lumMod val="75000"/>
-                  </a:schemeClr>
-                </a:solidFill>
-                <a:latin typeface="Lato" panose="020F0502020204030203" pitchFamily="34" charset="0"/>
-                <a:ea typeface="Lato" panose="020F0502020204030203" pitchFamily="34" charset="0"/>
-                <a:cs typeface="Lato" panose="020F0502020204030203" pitchFamily="34" charset="0"/>
-              </a:rPr>
-              <a:t>Requirements Fundamentals</a:t>
-            </a:r>
-          </a:p>
-          <a:p>
-            <a:pPr marL="457200" indent="-457200">
-              <a:buFont typeface="+mj-lt"/>
-              <a:buAutoNum type="arabicPeriod"/>
-            </a:pPr>
-            <a:endParaRPr lang="en-GB" sz="2000" dirty="0">
+              <a:rPr lang="en-GB" dirty="0" smtClean="0">
+                <a:latin typeface="Lato" panose="020F0502020204030203" pitchFamily="34" charset="0"/>
+                <a:ea typeface="Lato" panose="020F0502020204030203" pitchFamily="34" charset="0"/>
+                <a:cs typeface="Lato" panose="020F0502020204030203" pitchFamily="34" charset="0"/>
+              </a:rPr>
+              <a:t>Limitations of the tool  for frequency domain requirements</a:t>
+            </a:r>
+          </a:p>
+          <a:p>
+            <a:endParaRPr lang="en-GB" dirty="0" smtClean="0">
               <a:latin typeface="Lato" panose="020F0502020204030203" pitchFamily="34" charset="0"/>
               <a:ea typeface="Lato" panose="020F0502020204030203" pitchFamily="34" charset="0"/>
               <a:cs typeface="Lato" panose="020F0502020204030203" pitchFamily="34" charset="0"/>
             </a:endParaRPr>
           </a:p>
           <a:p>
-            <a:pPr marL="457200" indent="-457200">
-              <a:buFont typeface="+mj-lt"/>
-              <a:buAutoNum type="arabicPeriod"/>
-            </a:pPr>
-            <a:r>
-              <a:rPr lang="en-GB" sz="2000" dirty="0">
-                <a:solidFill>
-                  <a:schemeClr val="bg1">
-                    <a:lumMod val="75000"/>
-                  </a:schemeClr>
-                </a:solidFill>
-                <a:latin typeface="Lato" panose="020F0502020204030203" pitchFamily="34" charset="0"/>
-                <a:ea typeface="Lato" panose="020F0502020204030203" pitchFamily="34" charset="0"/>
-                <a:cs typeface="Lato" panose="020F0502020204030203" pitchFamily="34" charset="0"/>
-              </a:rPr>
-              <a:t>Formal Languages</a:t>
-            </a:r>
-          </a:p>
-          <a:p>
-            <a:pPr marL="457200" indent="-457200">
-              <a:buFont typeface="+mj-lt"/>
-              <a:buAutoNum type="arabicPeriod"/>
-            </a:pPr>
-            <a:endParaRPr lang="en-GB" sz="2000" dirty="0">
+            <a:r>
+              <a:rPr lang="en-GB" dirty="0" smtClean="0">
+                <a:latin typeface="Lato" panose="020F0502020204030203" pitchFamily="34" charset="0"/>
+                <a:ea typeface="Lato" panose="020F0502020204030203" pitchFamily="34" charset="0"/>
+                <a:cs typeface="Lato" panose="020F0502020204030203" pitchFamily="34" charset="0"/>
+              </a:rPr>
+              <a:t>Reason why:</a:t>
+            </a:r>
+          </a:p>
+          <a:p>
+            <a:r>
+              <a:rPr lang="en-GB" dirty="0">
+                <a:latin typeface="Lato" panose="020F0502020204030203" pitchFamily="34" charset="0"/>
+                <a:ea typeface="Lato" panose="020F0502020204030203" pitchFamily="34" charset="0"/>
+                <a:cs typeface="Lato" panose="020F0502020204030203" pitchFamily="34" charset="0"/>
+              </a:rPr>
+              <a:t>In this work frequency monitors have been programmed manually in </a:t>
+            </a:r>
+            <a:r>
+              <a:rPr lang="en-GB" dirty="0" err="1">
+                <a:latin typeface="Lato" panose="020F0502020204030203" pitchFamily="34" charset="0"/>
+                <a:ea typeface="Lato" panose="020F0502020204030203" pitchFamily="34" charset="0"/>
+                <a:cs typeface="Lato" panose="020F0502020204030203" pitchFamily="34" charset="0"/>
+              </a:rPr>
+              <a:t>simulink</a:t>
+            </a:r>
+            <a:r>
+              <a:rPr lang="en-GB" dirty="0" smtClean="0">
+                <a:latin typeface="Lato" panose="020F0502020204030203" pitchFamily="34" charset="0"/>
+                <a:ea typeface="Lato" panose="020F0502020204030203" pitchFamily="34" charset="0"/>
+                <a:cs typeface="Lato" panose="020F0502020204030203" pitchFamily="34" charset="0"/>
+              </a:rPr>
+              <a:t>,</a:t>
+            </a:r>
+            <a:endParaRPr lang="en-GB" dirty="0">
               <a:latin typeface="Lato" panose="020F0502020204030203" pitchFamily="34" charset="0"/>
               <a:ea typeface="Lato" panose="020F0502020204030203" pitchFamily="34" charset="0"/>
               <a:cs typeface="Lato" panose="020F0502020204030203" pitchFamily="34" charset="0"/>
             </a:endParaRPr>
           </a:p>
           <a:p>
-            <a:pPr marL="457200" indent="-457200">
-              <a:buFont typeface="+mj-lt"/>
-              <a:buAutoNum type="arabicPeriod"/>
-            </a:pPr>
-            <a:r>
-              <a:rPr lang="en-GB" sz="2000" dirty="0">
-                <a:solidFill>
-                  <a:schemeClr val="bg1">
-                    <a:lumMod val="75000"/>
-                  </a:schemeClr>
-                </a:solidFill>
-                <a:latin typeface="Lato" panose="020F0502020204030203" pitchFamily="34" charset="0"/>
-                <a:ea typeface="Lato" panose="020F0502020204030203" pitchFamily="34" charset="0"/>
-                <a:cs typeface="Lato" panose="020F0502020204030203" pitchFamily="34" charset="0"/>
-              </a:rPr>
-              <a:t>The Framework</a:t>
-            </a:r>
-          </a:p>
-          <a:p>
-            <a:pPr marL="457200" indent="-457200">
-              <a:buFont typeface="+mj-lt"/>
-              <a:buAutoNum type="arabicPeriod"/>
-            </a:pPr>
-            <a:endParaRPr lang="en-GB" sz="2000" dirty="0">
-              <a:solidFill>
-                <a:schemeClr val="bg1">
-                  <a:lumMod val="75000"/>
-                </a:schemeClr>
-              </a:solidFill>
+            <a:endParaRPr lang="en-GB" dirty="0" smtClean="0">
               <a:latin typeface="Lato" panose="020F0502020204030203" pitchFamily="34" charset="0"/>
               <a:ea typeface="Lato" panose="020F0502020204030203" pitchFamily="34" charset="0"/>
               <a:cs typeface="Lato" panose="020F0502020204030203" pitchFamily="34" charset="0"/>
             </a:endParaRPr>
           </a:p>
           <a:p>
-            <a:pPr marL="914400" lvl="1" indent="-457200">
-              <a:buFont typeface="+mj-lt"/>
-              <a:buAutoNum type="arabicPeriod"/>
-            </a:pPr>
-            <a:r>
-              <a:rPr lang="en-GB" sz="2000" dirty="0">
-                <a:solidFill>
-                  <a:schemeClr val="bg1">
-                    <a:lumMod val="75000"/>
-                  </a:schemeClr>
-                </a:solidFill>
-                <a:latin typeface="Lato" panose="020F0502020204030203" pitchFamily="34" charset="0"/>
-                <a:ea typeface="Lato" panose="020F0502020204030203" pitchFamily="34" charset="0"/>
-                <a:cs typeface="Lato" panose="020F0502020204030203" pitchFamily="34" charset="0"/>
-              </a:rPr>
-              <a:t>Modelling Libraries</a:t>
-            </a:r>
-          </a:p>
-          <a:p>
-            <a:pPr marL="914400" lvl="1" indent="-457200">
-              <a:buFont typeface="+mj-lt"/>
-              <a:buAutoNum type="arabicPeriod"/>
-            </a:pPr>
-            <a:endParaRPr lang="en-GB" sz="2000" dirty="0">
-              <a:solidFill>
-                <a:schemeClr val="bg1">
-                  <a:lumMod val="75000"/>
-                </a:schemeClr>
-              </a:solidFill>
+            <a:r>
+              <a:rPr lang="en-GB" dirty="0" smtClean="0">
+                <a:latin typeface="Lato" panose="020F0502020204030203" pitchFamily="34" charset="0"/>
+                <a:ea typeface="Lato" panose="020F0502020204030203" pitchFamily="34" charset="0"/>
+                <a:cs typeface="Lato" panose="020F0502020204030203" pitchFamily="34" charset="0"/>
+              </a:rPr>
+              <a:t>Objectives:</a:t>
+            </a:r>
+          </a:p>
+          <a:p>
+            <a:r>
+              <a:rPr lang="en-GB" dirty="0" smtClean="0">
+                <a:latin typeface="Lato" panose="020F0502020204030203" pitchFamily="34" charset="0"/>
+                <a:ea typeface="Lato" panose="020F0502020204030203" pitchFamily="34" charset="0"/>
+                <a:cs typeface="Lato" panose="020F0502020204030203" pitchFamily="34" charset="0"/>
+              </a:rPr>
+              <a:t>Optimize the existing procedure (provide online feedbacks)</a:t>
+            </a:r>
+          </a:p>
+          <a:p>
+            <a:r>
+              <a:rPr lang="en-GB" dirty="0" smtClean="0">
+                <a:latin typeface="Lato" panose="020F0502020204030203" pitchFamily="34" charset="0"/>
+                <a:ea typeface="Lato" panose="020F0502020204030203" pitchFamily="34" charset="0"/>
+                <a:cs typeface="Lato" panose="020F0502020204030203" pitchFamily="34" charset="0"/>
+              </a:rPr>
+              <a:t>Try to formalize with STL the suitable subset of the frequency response monitor to address gain margin and phase margin and bandwidth are satisfying </a:t>
+            </a:r>
+            <a:r>
+              <a:rPr lang="en-GB" dirty="0">
+                <a:latin typeface="Lato" panose="020F0502020204030203" pitchFamily="34" charset="0"/>
+                <a:ea typeface="Lato" panose="020F0502020204030203" pitchFamily="34" charset="0"/>
+                <a:cs typeface="Lato" panose="020F0502020204030203" pitchFamily="34" charset="0"/>
+              </a:rPr>
+              <a:t>certain thresholds and  relative stability of the system </a:t>
+            </a:r>
+            <a:endParaRPr lang="en-GB" dirty="0" smtClean="0">
               <a:latin typeface="Lato" panose="020F0502020204030203" pitchFamily="34" charset="0"/>
               <a:ea typeface="Lato" panose="020F0502020204030203" pitchFamily="34" charset="0"/>
               <a:cs typeface="Lato" panose="020F0502020204030203" pitchFamily="34" charset="0"/>
             </a:endParaRPr>
           </a:p>
           <a:p>
-            <a:pPr marL="914400" lvl="1" indent="-457200">
-              <a:buFont typeface="+mj-lt"/>
-              <a:buAutoNum type="arabicPeriod"/>
-            </a:pPr>
-            <a:r>
-              <a:rPr lang="en-GB" sz="2000" dirty="0">
-                <a:solidFill>
-                  <a:schemeClr val="bg1">
-                    <a:lumMod val="75000"/>
-                  </a:schemeClr>
-                </a:solidFill>
-                <a:latin typeface="Lato" panose="020F0502020204030203" pitchFamily="34" charset="0"/>
-                <a:ea typeface="Lato" panose="020F0502020204030203" pitchFamily="34" charset="0"/>
-                <a:cs typeface="Lato" panose="020F0502020204030203" pitchFamily="34" charset="0"/>
-              </a:rPr>
-              <a:t>Requirement Editor</a:t>
-            </a:r>
-          </a:p>
-          <a:p>
-            <a:pPr marL="914400" lvl="1" indent="-457200">
-              <a:buFont typeface="+mj-lt"/>
-              <a:buAutoNum type="arabicPeriod"/>
-            </a:pPr>
-            <a:endParaRPr lang="en-GB" sz="2000" dirty="0">
-              <a:solidFill>
-                <a:schemeClr val="bg1">
-                  <a:lumMod val="75000"/>
-                </a:schemeClr>
-              </a:solidFill>
+            <a:endParaRPr lang="en-GB" dirty="0">
               <a:latin typeface="Lato" panose="020F0502020204030203" pitchFamily="34" charset="0"/>
               <a:ea typeface="Lato" panose="020F0502020204030203" pitchFamily="34" charset="0"/>
               <a:cs typeface="Lato" panose="020F0502020204030203" pitchFamily="34" charset="0"/>
             </a:endParaRPr>
           </a:p>
           <a:p>
-            <a:pPr marL="914400" lvl="1" indent="-457200">
-              <a:buFont typeface="+mj-lt"/>
-              <a:buAutoNum type="arabicPeriod"/>
-            </a:pPr>
-            <a:r>
-              <a:rPr lang="en-GB" sz="2000" dirty="0">
-                <a:solidFill>
-                  <a:schemeClr val="bg1">
-                    <a:lumMod val="75000"/>
-                  </a:schemeClr>
-                </a:solidFill>
-                <a:latin typeface="Lato" panose="020F0502020204030203" pitchFamily="34" charset="0"/>
-                <a:ea typeface="Lato" panose="020F0502020204030203" pitchFamily="34" charset="0"/>
-                <a:cs typeface="Lato" panose="020F0502020204030203" pitchFamily="34" charset="0"/>
-              </a:rPr>
-              <a:t>Frequency Response</a:t>
-            </a:r>
-          </a:p>
-          <a:p>
-            <a:pPr marL="457200" indent="-457200">
-              <a:buFont typeface="+mj-lt"/>
-              <a:buAutoNum type="arabicPeriod"/>
-            </a:pPr>
-            <a:endParaRPr lang="en-GB" sz="2000" dirty="0">
-              <a:solidFill>
-                <a:schemeClr val="bg1">
-                  <a:lumMod val="75000"/>
-                </a:schemeClr>
-              </a:solidFill>
+            <a:endParaRPr lang="en-GB" dirty="0">
               <a:latin typeface="Lato" panose="020F0502020204030203" pitchFamily="34" charset="0"/>
               <a:ea typeface="Lato" panose="020F0502020204030203" pitchFamily="34" charset="0"/>
               <a:cs typeface="Lato" panose="020F0502020204030203" pitchFamily="34" charset="0"/>
             </a:endParaRPr>
           </a:p>
-          <a:p>
-            <a:pPr marL="457200" indent="-457200">
-              <a:buFont typeface="+mj-lt"/>
-              <a:buAutoNum type="arabicPeriod"/>
-            </a:pPr>
-            <a:r>
-              <a:rPr lang="en-GB" sz="2000" dirty="0">
-                <a:latin typeface="Lato" panose="020F0502020204030203" pitchFamily="34" charset="0"/>
-                <a:ea typeface="Lato" panose="020F0502020204030203" pitchFamily="34" charset="0"/>
-                <a:cs typeface="Lato" panose="020F0502020204030203" pitchFamily="34" charset="0"/>
-              </a:rPr>
-              <a:t>Conclusion</a:t>
-            </a:r>
-            <a:endParaRPr lang="en-GB" sz="2000" dirty="0">
-              <a:latin typeface="Lato" panose="020F0502020204030203" pitchFamily="34" charset="0"/>
-              <a:ea typeface="Lato" panose="020F0502020204030203" pitchFamily="34" charset="0"/>
-              <a:cs typeface="Lato" panose="020F0502020204030203" pitchFamily="34" charset="0"/>
-            </a:endParaRPr>
-          </a:p>
-        </p:txBody>
-      </p:sp>
+        </p:txBody>
+      </p:sp>
+      <p:pic>
+        <p:nvPicPr>
+          <p:cNvPr id="2052" name="Picture 4"/>
+          <p:cNvPicPr>
+            <a:picLocks noChangeAspect="1" noChangeArrowheads="1"/>
+          </p:cNvPicPr>
+          <p:nvPr/>
+        </p:nvPicPr>
+        <p:blipFill>
+          <a:blip r:embed="rId3">
+            <a:extLst>
+              <a:ext uri="{28A0092B-C50C-407E-A947-70E740481C1C}">
+                <a14:useLocalDpi xmlns:a14="http://schemas.microsoft.com/office/drawing/2010/main" val="0"/>
+              </a:ext>
+            </a:extLst>
+          </a:blip>
+          <a:srcRect/>
+          <a:stretch>
+            <a:fillRect/>
+          </a:stretch>
+        </p:blipFill>
+        <p:spPr bwMode="auto">
+          <a:xfrm>
+            <a:off x="3059832" y="4077072"/>
+            <a:ext cx="2819400" cy="2190750"/>
+          </a:xfrm>
+          <a:prstGeom prst="rect">
+            <a:avLst/>
+          </a:prstGeom>
+          <a:noFill/>
+          <a:ln>
+            <a:noFill/>
+          </a:ln>
+          <a:extLst>
+            <a:ext uri="{909E8E84-426E-40DD-AFC4-6F175D3DCCD1}">
+              <a14:hiddenFill xmlns:a14="http://schemas.microsoft.com/office/drawing/2010/main">
+                <a:solidFill>
+                  <a:schemeClr val="accent1"/>
+                </a:solidFill>
+              </a14:hiddenFill>
+            </a:ext>
+            <a:ext uri="{91240B29-F687-4F45-9708-019B960494DF}">
+              <a14:hiddenLine xmlns:a14="http://schemas.microsoft.com/office/drawing/2010/main" w="9525">
+                <a:solidFill>
+                  <a:schemeClr val="tx1"/>
+                </a:solidFill>
+                <a:miter lim="800000"/>
+                <a:headEnd/>
+                <a:tailEnd/>
+              </a14:hiddenLine>
+            </a:ext>
+          </a:extLst>
+        </p:spPr>
+      </p:pic>
     </p:spTree>
     <p:extLst>
       <p:ext uri="{BB962C8B-B14F-4D97-AF65-F5344CB8AC3E}">
-        <p14:creationId xmlns:p14="http://schemas.microsoft.com/office/powerpoint/2010/main" val="2926608038"/>
+        <p14:creationId xmlns:p14="http://schemas.microsoft.com/office/powerpoint/2010/main" val="3776495420"/>
       </p:ext>
     </p:extLst>
   </p:cSld>
@@ -24055,7 +25484,7 @@
                 <a:ea typeface="Lato" panose="020F0502020204030203" pitchFamily="34" charset="0"/>
                 <a:cs typeface="Lato" panose="020F0502020204030203" pitchFamily="34" charset="0"/>
               </a:rPr>
-              <a:t>July 4, 2017</a:t>
+              <a:t>July 5, 2017</a:t>
             </a:fld>
             <a:endParaRPr lang="en-US" dirty="0">
               <a:solidFill>
@@ -24160,8 +25589,8 @@
         </p:nvSpPr>
         <p:spPr>
           <a:xfrm>
-            <a:off x="395537" y="545134"/>
-            <a:ext cx="2880319" cy="461665"/>
+            <a:off x="395535" y="240837"/>
+            <a:ext cx="2398099" cy="461665"/>
           </a:xfrm>
           <a:prstGeom prst="rect">
             <a:avLst/>
@@ -24180,7 +25609,7 @@
                 <a:ea typeface="Lato Medium" panose="020F0502020204030203" pitchFamily="34" charset="0"/>
                 <a:cs typeface="Lato Medium" panose="020F0502020204030203" pitchFamily="34" charset="0"/>
               </a:rPr>
-              <a:t>Future Work</a:t>
+              <a:t>Outline</a:t>
             </a:r>
             <a:endParaRPr lang="en-US" sz="2400" b="1" dirty="0">
               <a:latin typeface="Lato Medium" panose="020F0502020204030203" pitchFamily="34" charset="0"/>
@@ -24236,8 +25665,8 @@
         </p:nvSpPr>
         <p:spPr>
           <a:xfrm>
-            <a:off x="395537" y="1052736"/>
-            <a:ext cx="2808311" cy="45719"/>
+            <a:off x="395535" y="748439"/>
+            <a:ext cx="2398099" cy="45719"/>
           </a:xfrm>
           <a:prstGeom prst="rect">
             <a:avLst/>
@@ -24285,8 +25714,8 @@
         </p:nvSpPr>
         <p:spPr>
           <a:xfrm>
-            <a:off x="395536" y="1231131"/>
-            <a:ext cx="8496943" cy="369332"/>
+            <a:off x="405288" y="1052736"/>
+            <a:ext cx="8496943" cy="4708981"/>
           </a:xfrm>
           <a:prstGeom prst="rect">
             <a:avLst/>
@@ -24299,64 +25728,255 @@
           </a:bodyPr>
           <a:lstStyle/>
           <a:p>
-            <a:r>
-              <a:rPr lang="en-GB" dirty="0" smtClean="0">
-                <a:latin typeface="Lato" panose="020F0502020204030203" pitchFamily="34" charset="0"/>
-                <a:ea typeface="Lato" panose="020F0502020204030203" pitchFamily="34" charset="0"/>
-                <a:cs typeface="Lato" panose="020F0502020204030203" pitchFamily="34" charset="0"/>
-              </a:rPr>
-              <a:t>text</a:t>
-            </a:r>
-            <a:endParaRPr lang="en-US" dirty="0">
+            <a:pPr marL="457200" indent="-457200">
+              <a:buFont typeface="+mj-lt"/>
+              <a:buAutoNum type="arabicPeriod"/>
+            </a:pPr>
+            <a:r>
+              <a:rPr lang="en-GB" sz="2000" dirty="0">
+                <a:solidFill>
+                  <a:schemeClr val="bg1">
+                    <a:lumMod val="75000"/>
+                  </a:schemeClr>
+                </a:solidFill>
+                <a:latin typeface="Lato" panose="020F0502020204030203" pitchFamily="34" charset="0"/>
+                <a:ea typeface="Lato" panose="020F0502020204030203" pitchFamily="34" charset="0"/>
+                <a:cs typeface="Lato" panose="020F0502020204030203" pitchFamily="34" charset="0"/>
+              </a:rPr>
+              <a:t>Introduction</a:t>
+            </a:r>
+          </a:p>
+          <a:p>
+            <a:pPr marL="457200" indent="-457200">
+              <a:buFont typeface="+mj-lt"/>
+              <a:buAutoNum type="arabicPeriod"/>
+            </a:pPr>
+            <a:endParaRPr lang="en-GB" sz="2000" dirty="0">
               <a:latin typeface="Lato" panose="020F0502020204030203" pitchFamily="34" charset="0"/>
               <a:ea typeface="Lato" panose="020F0502020204030203" pitchFamily="34" charset="0"/>
               <a:cs typeface="Lato" panose="020F0502020204030203" pitchFamily="34" charset="0"/>
             </a:endParaRPr>
           </a:p>
-        </p:txBody>
-      </p:sp>
-      <p:sp>
-        <p:nvSpPr>
-          <p:cNvPr id="12" name="TextBox 11"/>
-          <p:cNvSpPr txBox="1"/>
-          <p:nvPr/>
-        </p:nvSpPr>
-        <p:spPr>
-          <a:xfrm>
-            <a:off x="395536" y="237357"/>
-            <a:ext cx="2398100" cy="307777"/>
-          </a:xfrm>
-          <a:prstGeom prst="rect">
-            <a:avLst/>
-          </a:prstGeom>
-          <a:noFill/>
-        </p:spPr>
-        <p:txBody>
-          <a:bodyPr wrap="square" rtlCol="0">
-            <a:spAutoFit/>
-          </a:bodyPr>
-          <a:lstStyle/>
-          <a:p>
-            <a:r>
-              <a:rPr lang="en-GB" sz="1400" dirty="0" smtClean="0">
-                <a:latin typeface="Lato" panose="020F0502020204030203" pitchFamily="34" charset="0"/>
-                <a:ea typeface="Lato" panose="020F0502020204030203" pitchFamily="34" charset="0"/>
-                <a:cs typeface="Lato" panose="020F0502020204030203" pitchFamily="34" charset="0"/>
-              </a:rPr>
-              <a:t>Conclusion</a:t>
-            </a:r>
-            <a:endParaRPr lang="en-US" dirty="0">
+          <a:p>
+            <a:pPr marL="457200" indent="-457200">
+              <a:buFont typeface="+mj-lt"/>
+              <a:buAutoNum type="arabicPeriod"/>
+            </a:pPr>
+            <a:r>
+              <a:rPr lang="en-GB" sz="2000" dirty="0">
+                <a:solidFill>
+                  <a:schemeClr val="bg1">
+                    <a:lumMod val="75000"/>
+                  </a:schemeClr>
+                </a:solidFill>
+                <a:latin typeface="Lato" panose="020F0502020204030203" pitchFamily="34" charset="0"/>
+                <a:ea typeface="Lato" panose="020F0502020204030203" pitchFamily="34" charset="0"/>
+                <a:cs typeface="Lato" panose="020F0502020204030203" pitchFamily="34" charset="0"/>
+              </a:rPr>
+              <a:t>Requirements Fundamentals</a:t>
+            </a:r>
+          </a:p>
+          <a:p>
+            <a:pPr marL="457200" indent="-457200">
+              <a:buFont typeface="+mj-lt"/>
+              <a:buAutoNum type="arabicPeriod"/>
+            </a:pPr>
+            <a:endParaRPr lang="en-GB" sz="2000" dirty="0">
               <a:latin typeface="Lato" panose="020F0502020204030203" pitchFamily="34" charset="0"/>
               <a:ea typeface="Lato" panose="020F0502020204030203" pitchFamily="34" charset="0"/>
               <a:cs typeface="Lato" panose="020F0502020204030203" pitchFamily="34" charset="0"/>
             </a:endParaRPr>
           </a:p>
+          <a:p>
+            <a:pPr marL="457200" indent="-457200">
+              <a:buFont typeface="+mj-lt"/>
+              <a:buAutoNum type="arabicPeriod"/>
+            </a:pPr>
+            <a:r>
+              <a:rPr lang="en-GB" sz="2000" dirty="0">
+                <a:solidFill>
+                  <a:schemeClr val="bg1">
+                    <a:lumMod val="75000"/>
+                  </a:schemeClr>
+                </a:solidFill>
+                <a:latin typeface="Lato" panose="020F0502020204030203" pitchFamily="34" charset="0"/>
+                <a:ea typeface="Lato" panose="020F0502020204030203" pitchFamily="34" charset="0"/>
+                <a:cs typeface="Lato" panose="020F0502020204030203" pitchFamily="34" charset="0"/>
+              </a:rPr>
+              <a:t>Formal Languages</a:t>
+            </a:r>
+          </a:p>
+          <a:p>
+            <a:pPr marL="457200" indent="-457200">
+              <a:buFont typeface="+mj-lt"/>
+              <a:buAutoNum type="arabicPeriod"/>
+            </a:pPr>
+            <a:endParaRPr lang="en-GB" sz="2000" dirty="0">
+              <a:latin typeface="Lato" panose="020F0502020204030203" pitchFamily="34" charset="0"/>
+              <a:ea typeface="Lato" panose="020F0502020204030203" pitchFamily="34" charset="0"/>
+              <a:cs typeface="Lato" panose="020F0502020204030203" pitchFamily="34" charset="0"/>
+            </a:endParaRPr>
+          </a:p>
+          <a:p>
+            <a:pPr marL="457200" indent="-457200">
+              <a:buFont typeface="+mj-lt"/>
+              <a:buAutoNum type="arabicPeriod"/>
+            </a:pPr>
+            <a:r>
+              <a:rPr lang="en-GB" sz="2000" dirty="0">
+                <a:solidFill>
+                  <a:schemeClr val="bg1">
+                    <a:lumMod val="75000"/>
+                  </a:schemeClr>
+                </a:solidFill>
+                <a:latin typeface="Lato" panose="020F0502020204030203" pitchFamily="34" charset="0"/>
+                <a:ea typeface="Lato" panose="020F0502020204030203" pitchFamily="34" charset="0"/>
+                <a:cs typeface="Lato" panose="020F0502020204030203" pitchFamily="34" charset="0"/>
+              </a:rPr>
+              <a:t>The Framework</a:t>
+            </a:r>
+          </a:p>
+          <a:p>
+            <a:pPr marL="457200" indent="-457200">
+              <a:buFont typeface="+mj-lt"/>
+              <a:buAutoNum type="arabicPeriod"/>
+            </a:pPr>
+            <a:endParaRPr lang="en-GB" sz="2000" dirty="0">
+              <a:solidFill>
+                <a:schemeClr val="bg1">
+                  <a:lumMod val="75000"/>
+                </a:schemeClr>
+              </a:solidFill>
+              <a:latin typeface="Lato" panose="020F0502020204030203" pitchFamily="34" charset="0"/>
+              <a:ea typeface="Lato" panose="020F0502020204030203" pitchFamily="34" charset="0"/>
+              <a:cs typeface="Lato" panose="020F0502020204030203" pitchFamily="34" charset="0"/>
+            </a:endParaRPr>
+          </a:p>
+          <a:p>
+            <a:pPr marL="914400" lvl="1" indent="-457200">
+              <a:buFont typeface="+mj-lt"/>
+              <a:buAutoNum type="arabicPeriod"/>
+            </a:pPr>
+            <a:r>
+              <a:rPr lang="en-GB" sz="2000" dirty="0">
+                <a:solidFill>
+                  <a:schemeClr val="bg1">
+                    <a:lumMod val="75000"/>
+                  </a:schemeClr>
+                </a:solidFill>
+                <a:latin typeface="Lato" panose="020F0502020204030203" pitchFamily="34" charset="0"/>
+                <a:ea typeface="Lato" panose="020F0502020204030203" pitchFamily="34" charset="0"/>
+                <a:cs typeface="Lato" panose="020F0502020204030203" pitchFamily="34" charset="0"/>
+              </a:rPr>
+              <a:t>Modelling Libraries</a:t>
+            </a:r>
+          </a:p>
+          <a:p>
+            <a:pPr marL="914400" lvl="1" indent="-457200">
+              <a:buFont typeface="+mj-lt"/>
+              <a:buAutoNum type="arabicPeriod"/>
+            </a:pPr>
+            <a:endParaRPr lang="en-GB" sz="2000" dirty="0">
+              <a:solidFill>
+                <a:schemeClr val="bg1">
+                  <a:lumMod val="75000"/>
+                </a:schemeClr>
+              </a:solidFill>
+              <a:latin typeface="Lato" panose="020F0502020204030203" pitchFamily="34" charset="0"/>
+              <a:ea typeface="Lato" panose="020F0502020204030203" pitchFamily="34" charset="0"/>
+              <a:cs typeface="Lato" panose="020F0502020204030203" pitchFamily="34" charset="0"/>
+            </a:endParaRPr>
+          </a:p>
+          <a:p>
+            <a:pPr marL="914400" lvl="1" indent="-457200">
+              <a:buFont typeface="+mj-lt"/>
+              <a:buAutoNum type="arabicPeriod"/>
+            </a:pPr>
+            <a:r>
+              <a:rPr lang="en-GB" sz="2000" dirty="0">
+                <a:solidFill>
+                  <a:schemeClr val="bg1">
+                    <a:lumMod val="75000"/>
+                  </a:schemeClr>
+                </a:solidFill>
+                <a:latin typeface="Lato" panose="020F0502020204030203" pitchFamily="34" charset="0"/>
+                <a:ea typeface="Lato" panose="020F0502020204030203" pitchFamily="34" charset="0"/>
+                <a:cs typeface="Lato" panose="020F0502020204030203" pitchFamily="34" charset="0"/>
+              </a:rPr>
+              <a:t>Requirement Editor</a:t>
+            </a:r>
+          </a:p>
+          <a:p>
+            <a:pPr marL="914400" lvl="1" indent="-457200">
+              <a:buFont typeface="+mj-lt"/>
+              <a:buAutoNum type="arabicPeriod"/>
+            </a:pPr>
+            <a:endParaRPr lang="en-GB" sz="2000" dirty="0">
+              <a:solidFill>
+                <a:schemeClr val="bg1">
+                  <a:lumMod val="75000"/>
+                </a:schemeClr>
+              </a:solidFill>
+              <a:latin typeface="Lato" panose="020F0502020204030203" pitchFamily="34" charset="0"/>
+              <a:ea typeface="Lato" panose="020F0502020204030203" pitchFamily="34" charset="0"/>
+              <a:cs typeface="Lato" panose="020F0502020204030203" pitchFamily="34" charset="0"/>
+            </a:endParaRPr>
+          </a:p>
+          <a:p>
+            <a:pPr marL="914400" lvl="1" indent="-457200">
+              <a:buFont typeface="+mj-lt"/>
+              <a:buAutoNum type="arabicPeriod"/>
+            </a:pPr>
+            <a:r>
+              <a:rPr lang="en-GB" sz="2000" dirty="0">
+                <a:solidFill>
+                  <a:schemeClr val="bg1">
+                    <a:lumMod val="75000"/>
+                  </a:schemeClr>
+                </a:solidFill>
+                <a:latin typeface="Lato" panose="020F0502020204030203" pitchFamily="34" charset="0"/>
+                <a:ea typeface="Lato" panose="020F0502020204030203" pitchFamily="34" charset="0"/>
+                <a:cs typeface="Lato" panose="020F0502020204030203" pitchFamily="34" charset="0"/>
+              </a:rPr>
+              <a:t>Frequency Response</a:t>
+            </a:r>
+          </a:p>
+          <a:p>
+            <a:pPr marL="457200" indent="-457200">
+              <a:buFont typeface="+mj-lt"/>
+              <a:buAutoNum type="arabicPeriod"/>
+            </a:pPr>
+            <a:endParaRPr lang="en-GB" sz="2000" dirty="0">
+              <a:solidFill>
+                <a:schemeClr val="bg1">
+                  <a:lumMod val="75000"/>
+                </a:schemeClr>
+              </a:solidFill>
+              <a:latin typeface="Lato" panose="020F0502020204030203" pitchFamily="34" charset="0"/>
+              <a:ea typeface="Lato" panose="020F0502020204030203" pitchFamily="34" charset="0"/>
+              <a:cs typeface="Lato" panose="020F0502020204030203" pitchFamily="34" charset="0"/>
+            </a:endParaRPr>
+          </a:p>
+          <a:p>
+            <a:pPr marL="457200" indent="-457200">
+              <a:buFont typeface="+mj-lt"/>
+              <a:buAutoNum type="arabicPeriod"/>
+            </a:pPr>
+            <a:r>
+              <a:rPr lang="en-GB" sz="2000" dirty="0">
+                <a:latin typeface="Lato" panose="020F0502020204030203" pitchFamily="34" charset="0"/>
+                <a:ea typeface="Lato" panose="020F0502020204030203" pitchFamily="34" charset="0"/>
+                <a:cs typeface="Lato" panose="020F0502020204030203" pitchFamily="34" charset="0"/>
+              </a:rPr>
+              <a:t>Conclusion</a:t>
+            </a:r>
+          </a:p>
         </p:txBody>
       </p:sp>
     </p:spTree>
     <p:extLst>
       <p:ext uri="{BB962C8B-B14F-4D97-AF65-F5344CB8AC3E}">
-        <p14:creationId xmlns:p14="http://schemas.microsoft.com/office/powerpoint/2010/main" val="2054595458"/>
+        <p14:creationId xmlns:p14="http://schemas.microsoft.com/office/powerpoint/2010/main" val="2926608038"/>
       </p:ext>
     </p:extLst>
   </p:cSld>
@@ -24468,7 +26088,7 @@
                 <a:ea typeface="Lato" panose="020F0502020204030203" pitchFamily="34" charset="0"/>
                 <a:cs typeface="Lato" panose="020F0502020204030203" pitchFamily="34" charset="0"/>
               </a:rPr>
-              <a:t>July 4, 2017</a:t>
+              <a:t>July 5, 2017</a:t>
             </a:fld>
             <a:endParaRPr lang="en-US" dirty="0">
               <a:solidFill>
@@ -24553,6 +26173,419 @@
                 <a:cs typeface="Lato" panose="020F0502020204030203" pitchFamily="34" charset="0"/>
               </a:rPr>
               <a:t>28</a:t>
+            </a:fld>
+            <a:endParaRPr lang="en-US" dirty="0">
+              <a:solidFill>
+                <a:schemeClr val="tx1"/>
+              </a:solidFill>
+              <a:latin typeface="Lato" panose="020F0502020204030203" pitchFamily="34" charset="0"/>
+              <a:ea typeface="Lato" panose="020F0502020204030203" pitchFamily="34" charset="0"/>
+              <a:cs typeface="Lato" panose="020F0502020204030203" pitchFamily="34" charset="0"/>
+            </a:endParaRPr>
+          </a:p>
+        </p:txBody>
+      </p:sp>
+      <p:sp>
+        <p:nvSpPr>
+          <p:cNvPr id="10" name="TextBox 9"/>
+          <p:cNvSpPr txBox="1"/>
+          <p:nvPr/>
+        </p:nvSpPr>
+        <p:spPr>
+          <a:xfrm>
+            <a:off x="395537" y="545134"/>
+            <a:ext cx="2880319" cy="461665"/>
+          </a:xfrm>
+          <a:prstGeom prst="rect">
+            <a:avLst/>
+          </a:prstGeom>
+          <a:noFill/>
+        </p:spPr>
+        <p:txBody>
+          <a:bodyPr wrap="square" rtlCol="0">
+            <a:spAutoFit/>
+          </a:bodyPr>
+          <a:lstStyle/>
+          <a:p>
+            <a:r>
+              <a:rPr lang="en-GB" sz="2400" b="1" dirty="0" smtClean="0">
+                <a:latin typeface="Lato Medium" panose="020F0502020204030203" pitchFamily="34" charset="0"/>
+                <a:ea typeface="Lato Medium" panose="020F0502020204030203" pitchFamily="34" charset="0"/>
+                <a:cs typeface="Lato Medium" panose="020F0502020204030203" pitchFamily="34" charset="0"/>
+              </a:rPr>
+              <a:t>Future Work</a:t>
+            </a:r>
+            <a:endParaRPr lang="en-US" sz="2400" b="1" dirty="0">
+              <a:latin typeface="Lato Medium" panose="020F0502020204030203" pitchFamily="34" charset="0"/>
+              <a:ea typeface="Lato Medium" panose="020F0502020204030203" pitchFamily="34" charset="0"/>
+              <a:cs typeface="Lato Medium" panose="020F0502020204030203" pitchFamily="34" charset="0"/>
+            </a:endParaRPr>
+          </a:p>
+        </p:txBody>
+      </p:sp>
+      <p:sp>
+        <p:nvSpPr>
+          <p:cNvPr id="11" name="TextBox 10"/>
+          <p:cNvSpPr txBox="1"/>
+          <p:nvPr/>
+        </p:nvSpPr>
+        <p:spPr>
+          <a:xfrm>
+            <a:off x="564638" y="6504111"/>
+            <a:ext cx="1029947" cy="276999"/>
+          </a:xfrm>
+          <a:prstGeom prst="rect">
+            <a:avLst/>
+          </a:prstGeom>
+          <a:noFill/>
+        </p:spPr>
+        <p:txBody>
+          <a:bodyPr wrap="square" rtlCol="0">
+            <a:spAutoFit/>
+          </a:bodyPr>
+          <a:lstStyle/>
+          <a:p>
+            <a:r>
+              <a:rPr lang="en-GB" sz="1200" dirty="0" smtClean="0">
+                <a:latin typeface="Lato" panose="020F0502020204030203" pitchFamily="34" charset="0"/>
+                <a:ea typeface="Lato" panose="020F0502020204030203" pitchFamily="34" charset="0"/>
+                <a:cs typeface="Lato" panose="020F0502020204030203" pitchFamily="34" charset="0"/>
+              </a:rPr>
+              <a:t>M.Celia</a:t>
+            </a:r>
+            <a:endParaRPr lang="en-US" sz="1200" dirty="0">
+              <a:latin typeface="Lato" panose="020F0502020204030203" pitchFamily="34" charset="0"/>
+              <a:ea typeface="Lato" panose="020F0502020204030203" pitchFamily="34" charset="0"/>
+              <a:cs typeface="Lato" panose="020F0502020204030203" pitchFamily="34" charset="0"/>
+            </a:endParaRPr>
+          </a:p>
+        </p:txBody>
+      </p:sp>
+      <p:sp>
+        <p:nvSpPr>
+          <p:cNvPr id="2" name="Rectangle 1"/>
+          <p:cNvSpPr/>
+          <p:nvPr/>
+        </p:nvSpPr>
+        <p:spPr>
+          <a:xfrm>
+            <a:off x="395537" y="1052736"/>
+            <a:ext cx="2808311" cy="45719"/>
+          </a:xfrm>
+          <a:prstGeom prst="rect">
+            <a:avLst/>
+          </a:prstGeom>
+          <a:solidFill>
+            <a:schemeClr val="tx2">
+              <a:lumMod val="60000"/>
+              <a:lumOff val="40000"/>
+            </a:schemeClr>
+          </a:solidFill>
+          <a:ln>
+            <a:noFill/>
+          </a:ln>
+        </p:spPr>
+        <p:style>
+          <a:lnRef idx="2">
+            <a:schemeClr val="accent1">
+              <a:shade val="50000"/>
+            </a:schemeClr>
+          </a:lnRef>
+          <a:fillRef idx="1">
+            <a:schemeClr val="accent1"/>
+          </a:fillRef>
+          <a:effectRef idx="0">
+            <a:schemeClr val="accent1"/>
+          </a:effectRef>
+          <a:fontRef idx="minor">
+            <a:schemeClr val="lt1"/>
+          </a:fontRef>
+        </p:style>
+        <p:txBody>
+          <a:bodyPr rtlCol="0" anchor="ctr"/>
+          <a:lstStyle/>
+          <a:p>
+            <a:pPr algn="ctr"/>
+            <a:endParaRPr lang="en-US"/>
+          </a:p>
+        </p:txBody>
+      </p:sp>
+      <p:sp>
+        <p:nvSpPr>
+          <p:cNvPr id="13" name="TextBox 12"/>
+          <p:cNvSpPr txBox="1"/>
+          <p:nvPr/>
+        </p:nvSpPr>
+        <p:spPr>
+          <a:xfrm>
+            <a:off x="395536" y="1231131"/>
+            <a:ext cx="8496943" cy="369332"/>
+          </a:xfrm>
+          <a:prstGeom prst="rect">
+            <a:avLst/>
+          </a:prstGeom>
+          <a:noFill/>
+        </p:spPr>
+        <p:txBody>
+          <a:bodyPr wrap="square" rtlCol="0">
+            <a:spAutoFit/>
+          </a:bodyPr>
+          <a:lstStyle/>
+          <a:p>
+            <a:r>
+              <a:rPr lang="en-GB" dirty="0" smtClean="0">
+                <a:latin typeface="Lato" panose="020F0502020204030203" pitchFamily="34" charset="0"/>
+                <a:ea typeface="Lato" panose="020F0502020204030203" pitchFamily="34" charset="0"/>
+                <a:cs typeface="Lato" panose="020F0502020204030203" pitchFamily="34" charset="0"/>
+              </a:rPr>
+              <a:t>text</a:t>
+            </a:r>
+            <a:endParaRPr lang="en-US" dirty="0">
+              <a:latin typeface="Lato" panose="020F0502020204030203" pitchFamily="34" charset="0"/>
+              <a:ea typeface="Lato" panose="020F0502020204030203" pitchFamily="34" charset="0"/>
+              <a:cs typeface="Lato" panose="020F0502020204030203" pitchFamily="34" charset="0"/>
+            </a:endParaRPr>
+          </a:p>
+        </p:txBody>
+      </p:sp>
+      <p:sp>
+        <p:nvSpPr>
+          <p:cNvPr id="12" name="TextBox 11"/>
+          <p:cNvSpPr txBox="1"/>
+          <p:nvPr/>
+        </p:nvSpPr>
+        <p:spPr>
+          <a:xfrm>
+            <a:off x="395536" y="237357"/>
+            <a:ext cx="2398100" cy="307777"/>
+          </a:xfrm>
+          <a:prstGeom prst="rect">
+            <a:avLst/>
+          </a:prstGeom>
+          <a:noFill/>
+        </p:spPr>
+        <p:txBody>
+          <a:bodyPr wrap="square" rtlCol="0">
+            <a:spAutoFit/>
+          </a:bodyPr>
+          <a:lstStyle/>
+          <a:p>
+            <a:r>
+              <a:rPr lang="en-GB" sz="1400" dirty="0" smtClean="0">
+                <a:latin typeface="Lato" panose="020F0502020204030203" pitchFamily="34" charset="0"/>
+                <a:ea typeface="Lato" panose="020F0502020204030203" pitchFamily="34" charset="0"/>
+                <a:cs typeface="Lato" panose="020F0502020204030203" pitchFamily="34" charset="0"/>
+              </a:rPr>
+              <a:t>Conclusion</a:t>
+            </a:r>
+            <a:endParaRPr lang="en-US" dirty="0">
+              <a:latin typeface="Lato" panose="020F0502020204030203" pitchFamily="34" charset="0"/>
+              <a:ea typeface="Lato" panose="020F0502020204030203" pitchFamily="34" charset="0"/>
+              <a:cs typeface="Lato" panose="020F0502020204030203" pitchFamily="34" charset="0"/>
+            </a:endParaRPr>
+          </a:p>
+        </p:txBody>
+      </p:sp>
+    </p:spTree>
+    <p:extLst>
+      <p:ext uri="{BB962C8B-B14F-4D97-AF65-F5344CB8AC3E}">
+        <p14:creationId xmlns:p14="http://schemas.microsoft.com/office/powerpoint/2010/main" val="2054595458"/>
+      </p:ext>
+    </p:extLst>
+  </p:cSld>
+  <p:clrMapOvr>
+    <a:masterClrMapping/>
+  </p:clrMapOvr>
+  <p:timing>
+    <p:tnLst>
+      <p:par>
+        <p:cTn id="1" dur="indefinite" restart="never" nodeType="tmRoot"/>
+      </p:par>
+    </p:tnLst>
+  </p:timing>
+</p:sld>
+</file>
+
+<file path=ppt/slides/slide29.xml><?xml version="1.0" encoding="utf-8"?>
+<p:sld xmlns:a="http://schemas.openxmlformats.org/drawingml/2006/main" xmlns:r="http://schemas.openxmlformats.org/officeDocument/2006/relationships" xmlns:p="http://schemas.openxmlformats.org/presentationml/2006/main">
+  <p:cSld>
+    <p:spTree>
+      <p:nvGrpSpPr>
+        <p:cNvPr id="1" name=""/>
+        <p:cNvGrpSpPr/>
+        <p:nvPr/>
+      </p:nvGrpSpPr>
+      <p:grpSpPr>
+        <a:xfrm>
+          <a:off x="0" y="0"/>
+          <a:ext cx="0" cy="0"/>
+          <a:chOff x="0" y="0"/>
+          <a:chExt cx="0" cy="0"/>
+        </a:xfrm>
+      </p:grpSpPr>
+      <p:sp>
+        <p:nvSpPr>
+          <p:cNvPr id="6" name="Rectangle 5"/>
+          <p:cNvSpPr/>
+          <p:nvPr/>
+        </p:nvSpPr>
+        <p:spPr>
+          <a:xfrm>
+            <a:off x="0" y="6409155"/>
+            <a:ext cx="9144000" cy="448843"/>
+          </a:xfrm>
+          <a:prstGeom prst="rect">
+            <a:avLst/>
+          </a:prstGeom>
+          <a:solidFill>
+            <a:schemeClr val="bg2"/>
+          </a:solidFill>
+          <a:ln>
+            <a:solidFill>
+              <a:schemeClr val="bg2"/>
+            </a:solidFill>
+          </a:ln>
+        </p:spPr>
+        <p:style>
+          <a:lnRef idx="2">
+            <a:schemeClr val="accent1">
+              <a:shade val="50000"/>
+            </a:schemeClr>
+          </a:lnRef>
+          <a:fillRef idx="1">
+            <a:schemeClr val="accent1"/>
+          </a:fillRef>
+          <a:effectRef idx="0">
+            <a:schemeClr val="accent1"/>
+          </a:effectRef>
+          <a:fontRef idx="minor">
+            <a:schemeClr val="lt1"/>
+          </a:fontRef>
+        </p:style>
+        <p:txBody>
+          <a:bodyPr rtlCol="0" anchor="ctr"/>
+          <a:lstStyle/>
+          <a:p>
+            <a:pPr algn="ctr"/>
+            <a:endParaRPr lang="en-US"/>
+          </a:p>
+        </p:txBody>
+      </p:sp>
+      <p:sp>
+        <p:nvSpPr>
+          <p:cNvPr id="7" name="Date Placeholder 6"/>
+          <p:cNvSpPr>
+            <a:spLocks noGrp="1"/>
+          </p:cNvSpPr>
+          <p:nvPr>
+            <p:ph type="dt" sz="half" idx="10"/>
+          </p:nvPr>
+        </p:nvSpPr>
+        <p:spPr>
+          <a:xfrm>
+            <a:off x="1762839" y="6409155"/>
+            <a:ext cx="2061592" cy="448843"/>
+          </a:xfrm>
+        </p:spPr>
+        <p:txBody>
+          <a:bodyPr/>
+          <a:lstStyle/>
+          <a:p>
+            <a:pPr algn="ctr"/>
+            <a:fld id="{6C4E8271-70CA-4668-9C33-BE25780D6213}" type="datetime4">
+              <a:rPr lang="en-US" smtClean="0">
+                <a:solidFill>
+                  <a:schemeClr val="tx1"/>
+                </a:solidFill>
+                <a:latin typeface="Lato" panose="020F0502020204030203" pitchFamily="34" charset="0"/>
+                <a:ea typeface="Lato" panose="020F0502020204030203" pitchFamily="34" charset="0"/>
+                <a:cs typeface="Lato" panose="020F0502020204030203" pitchFamily="34" charset="0"/>
+              </a:rPr>
+              <a:t>July 5, 2017</a:t>
+            </a:fld>
+            <a:endParaRPr lang="en-US" dirty="0">
+              <a:solidFill>
+                <a:schemeClr val="tx1"/>
+              </a:solidFill>
+              <a:latin typeface="Lato" panose="020F0502020204030203" pitchFamily="34" charset="0"/>
+              <a:ea typeface="Lato" panose="020F0502020204030203" pitchFamily="34" charset="0"/>
+              <a:cs typeface="Lato" panose="020F0502020204030203" pitchFamily="34" charset="0"/>
+            </a:endParaRPr>
+          </a:p>
+        </p:txBody>
+      </p:sp>
+      <p:sp>
+        <p:nvSpPr>
+          <p:cNvPr id="8" name="Footer Placeholder 7"/>
+          <p:cNvSpPr>
+            <a:spLocks noGrp="1"/>
+          </p:cNvSpPr>
+          <p:nvPr>
+            <p:ph type="ftr" sz="quarter" idx="11"/>
+          </p:nvPr>
+        </p:nvSpPr>
+        <p:spPr>
+          <a:xfrm>
+            <a:off x="4427984" y="6409155"/>
+            <a:ext cx="2895600" cy="448843"/>
+          </a:xfrm>
+        </p:spPr>
+        <p:txBody>
+          <a:bodyPr/>
+          <a:lstStyle/>
+          <a:p>
+            <a:r>
+              <a:rPr lang="en-US" dirty="0" smtClean="0">
+                <a:solidFill>
+                  <a:schemeClr val="tx1"/>
+                </a:solidFill>
+                <a:latin typeface="Lato" panose="020F0502020204030203" pitchFamily="34" charset="0"/>
+                <a:ea typeface="Lato" panose="020F0502020204030203" pitchFamily="34" charset="0"/>
+                <a:cs typeface="Lato" panose="020F0502020204030203" pitchFamily="34" charset="0"/>
+              </a:rPr>
+              <a:t>United Technologies Research Center</a:t>
+            </a:r>
+            <a:endParaRPr lang="en-US" dirty="0">
+              <a:solidFill>
+                <a:schemeClr val="tx1"/>
+              </a:solidFill>
+              <a:latin typeface="Lato" panose="020F0502020204030203" pitchFamily="34" charset="0"/>
+              <a:ea typeface="Lato" panose="020F0502020204030203" pitchFamily="34" charset="0"/>
+              <a:cs typeface="Lato" panose="020F0502020204030203" pitchFamily="34" charset="0"/>
+            </a:endParaRPr>
+          </a:p>
+        </p:txBody>
+      </p:sp>
+      <p:sp>
+        <p:nvSpPr>
+          <p:cNvPr id="9" name="Slide Number Placeholder 8"/>
+          <p:cNvSpPr>
+            <a:spLocks noGrp="1"/>
+          </p:cNvSpPr>
+          <p:nvPr>
+            <p:ph type="sldNum" sz="quarter" idx="12"/>
+          </p:nvPr>
+        </p:nvSpPr>
+        <p:spPr>
+          <a:xfrm>
+            <a:off x="6553200" y="6409154"/>
+            <a:ext cx="2133600" cy="448845"/>
+          </a:xfrm>
+        </p:spPr>
+        <p:txBody>
+          <a:bodyPr/>
+          <a:lstStyle/>
+          <a:p>
+            <a:fld id="{77D5BC96-C262-44A9-A0BB-2BDA2E2D380A}" type="slidenum">
+              <a:rPr lang="en-US" smtClean="0">
+                <a:solidFill>
+                  <a:schemeClr val="tx1"/>
+                </a:solidFill>
+                <a:latin typeface="Lato" panose="020F0502020204030203" pitchFamily="34" charset="0"/>
+                <a:ea typeface="Lato" panose="020F0502020204030203" pitchFamily="34" charset="0"/>
+                <a:cs typeface="Lato" panose="020F0502020204030203" pitchFamily="34" charset="0"/>
+              </a:rPr>
+              <a:t>29</a:t>
             </a:fld>
             <a:endParaRPr lang="en-US" dirty="0">
               <a:solidFill>
@@ -24843,7 +26876,7 @@
                 <a:ea typeface="Lato" panose="020F0502020204030203" pitchFamily="34" charset="0"/>
                 <a:cs typeface="Lato" panose="020F0502020204030203" pitchFamily="34" charset="0"/>
               </a:rPr>
-              <a:t>July 4, 2017</a:t>
+              <a:t>July 5, 2017</a:t>
             </a:fld>
             <a:endParaRPr lang="en-US" dirty="0">
               <a:solidFill>
@@ -25207,11 +27240,6 @@
               </a:rPr>
               <a:t>User</a:t>
             </a:r>
-            <a:endParaRPr lang="en-GB" sz="1600" dirty="0" smtClean="0">
-              <a:solidFill>
-                <a:schemeClr val="tx1"/>
-              </a:solidFill>
-            </a:endParaRPr>
           </a:p>
           <a:p>
             <a:pPr algn="ctr"/>
@@ -25809,11 +27837,11 @@
   <p:clrMapOvr>
     <a:masterClrMapping/>
   </p:clrMapOvr>
-  <mc:AlternateContent xmlns:mc="http://schemas.openxmlformats.org/markup-compatibility/2006">
-    <mc:Choice xmlns:p14="http://schemas.microsoft.com/office/powerpoint/2010/main" Requires="p14">
+  <mc:AlternateContent xmlns:mc="http://schemas.openxmlformats.org/markup-compatibility/2006" xmlns:p14="http://schemas.microsoft.com/office/powerpoint/2010/main">
+    <mc:Choice Requires="p14">
       <p:transition p14:dur="0"/>
     </mc:Choice>
-    <mc:Fallback>
+    <mc:Fallback xmlns="">
       <p:transition/>
     </mc:Fallback>
   </mc:AlternateContent>
@@ -25993,7 +28021,7 @@
                 <a:ea typeface="Lato" panose="020F0502020204030203" pitchFamily="34" charset="0"/>
                 <a:cs typeface="Lato" panose="020F0502020204030203" pitchFamily="34" charset="0"/>
               </a:rPr>
-              <a:t>July 4, 2017</a:t>
+              <a:t>July 5, 2017</a:t>
             </a:fld>
             <a:endParaRPr lang="en-US" dirty="0">
               <a:solidFill>
@@ -26435,7 +28463,7 @@
                 <a:ea typeface="Lato" panose="020F0502020204030203" pitchFamily="34" charset="0"/>
                 <a:cs typeface="Lato" panose="020F0502020204030203" pitchFamily="34" charset="0"/>
               </a:rPr>
-              <a:t>July 4, 2017</a:t>
+              <a:t>July 5, 2017</a:t>
             </a:fld>
             <a:endParaRPr lang="en-US" dirty="0">
               <a:solidFill>
@@ -27039,7 +29067,7 @@
                 <a:ea typeface="Lato" panose="020F0502020204030203" pitchFamily="34" charset="0"/>
                 <a:cs typeface="Lato" panose="020F0502020204030203" pitchFamily="34" charset="0"/>
               </a:rPr>
-              <a:t>July 4, 2017</a:t>
+              <a:t>July 5, 2017</a:t>
             </a:fld>
             <a:endParaRPr lang="en-US" dirty="0">
               <a:solidFill>
@@ -27334,37 +29362,8 @@
                 <a:ea typeface="Lato" panose="020F0502020204030203" pitchFamily="34" charset="0"/>
                 <a:cs typeface="Lato" panose="020F0502020204030203" pitchFamily="34" charset="0"/>
               </a:rPr>
-              <a:t>A </a:t>
-            </a:r>
-            <a:r>
-              <a:rPr lang="en-GB" dirty="0" smtClean="0">
-                <a:latin typeface="Lato" panose="020F0502020204030203" pitchFamily="34" charset="0"/>
-                <a:ea typeface="Lato" panose="020F0502020204030203" pitchFamily="34" charset="0"/>
-                <a:cs typeface="Lato" panose="020F0502020204030203" pitchFamily="34" charset="0"/>
-              </a:rPr>
-              <a:t>well-defined </a:t>
-            </a:r>
-            <a:r>
-              <a:rPr lang="en-GB" dirty="0" smtClean="0">
-                <a:latin typeface="Lato" panose="020F0502020204030203" pitchFamily="34" charset="0"/>
-                <a:ea typeface="Lato" panose="020F0502020204030203" pitchFamily="34" charset="0"/>
-                <a:cs typeface="Lato" panose="020F0502020204030203" pitchFamily="34" charset="0"/>
-              </a:rPr>
-              <a:t>Product </a:t>
-            </a:r>
-            <a:r>
-              <a:rPr lang="en-GB" dirty="0" smtClean="0">
-                <a:latin typeface="Lato" panose="020F0502020204030203" pitchFamily="34" charset="0"/>
-                <a:ea typeface="Lato" panose="020F0502020204030203" pitchFamily="34" charset="0"/>
-                <a:cs typeface="Lato" panose="020F0502020204030203" pitchFamily="34" charset="0"/>
-              </a:rPr>
-              <a:t>Requirements</a:t>
-            </a:r>
-            <a:endParaRPr lang="en-GB" dirty="0" smtClean="0">
-              <a:latin typeface="Lato" panose="020F0502020204030203" pitchFamily="34" charset="0"/>
-              <a:ea typeface="Lato" panose="020F0502020204030203" pitchFamily="34" charset="0"/>
-              <a:cs typeface="Lato" panose="020F0502020204030203" pitchFamily="34" charset="0"/>
-            </a:endParaRPr>
+              <a:t>A well-defined Product Requirements</a:t>
+            </a:r>
           </a:p>
         </p:txBody>
       </p:sp>
@@ -28007,7 +30006,7 @@
                 <a:ea typeface="Lato" panose="020F0502020204030203" pitchFamily="34" charset="0"/>
                 <a:cs typeface="Lato" panose="020F0502020204030203" pitchFamily="34" charset="0"/>
               </a:rPr>
-              <a:t>July 4, 2017</a:t>
+              <a:t>July 5, 2017</a:t>
             </a:fld>
             <a:endParaRPr lang="en-US" dirty="0">
               <a:solidFill>
@@ -28132,15 +30131,7 @@
                 <a:ea typeface="Lato Medium" panose="020F0502020204030203" pitchFamily="34" charset="0"/>
                 <a:cs typeface="Lato Medium" panose="020F0502020204030203" pitchFamily="34" charset="0"/>
               </a:rPr>
-              <a:t>Specification </a:t>
-            </a:r>
-            <a:r>
-              <a:rPr lang="en-GB" sz="2400" b="1" dirty="0" smtClean="0">
-                <a:latin typeface="Lato Medium" panose="020F0502020204030203" pitchFamily="34" charset="0"/>
-                <a:ea typeface="Lato Medium" panose="020F0502020204030203" pitchFamily="34" charset="0"/>
-                <a:cs typeface="Lato Medium" panose="020F0502020204030203" pitchFamily="34" charset="0"/>
-              </a:rPr>
-              <a:t>Languages for Requirements Definition</a:t>
+              <a:t>Specification Languages for Requirements Definition</a:t>
             </a:r>
             <a:endParaRPr lang="en-US" sz="2400" b="1" dirty="0">
               <a:latin typeface="Lato Medium" panose="020F0502020204030203" pitchFamily="34" charset="0"/>
@@ -29356,7 +31347,7 @@
                 <a:ea typeface="Lato" panose="020F0502020204030203" pitchFamily="34" charset="0"/>
                 <a:cs typeface="Lato" panose="020F0502020204030203" pitchFamily="34" charset="0"/>
               </a:rPr>
-              <a:t>July 4, 2017</a:t>
+              <a:t>July 5, 2017</a:t>
             </a:fld>
             <a:endParaRPr lang="en-US" dirty="0">
               <a:solidFill>
@@ -30957,7 +32948,7 @@
                 <a:ea typeface="Lato" panose="020F0502020204030203" pitchFamily="34" charset="0"/>
                 <a:cs typeface="Lato" panose="020F0502020204030203" pitchFamily="34" charset="0"/>
               </a:rPr>
-              <a:t>July 4, 2017</a:t>
+              <a:t>July 5, 2017</a:t>
             </a:fld>
             <a:endParaRPr lang="en-US" dirty="0">
               <a:solidFill>

</xml_diff>